<commit_message>
[README root] Update Figure 2
</commit_message>
<xml_diff>
--- a/README_files/images/figures.pptx
+++ b/README_files/images/figures.pptx
@@ -5,12 +5,8 @@
     <p:sldMasterId id="2147483648" r:id="rId1"/>
   </p:sldMasterIdLst>
   <p:sldIdLst>
-    <p:sldId id="260" r:id="rId2"/>
-    <p:sldId id="264" r:id="rId3"/>
-    <p:sldId id="263" r:id="rId4"/>
-    <p:sldId id="262" r:id="rId5"/>
-    <p:sldId id="261" r:id="rId6"/>
-    <p:sldId id="265" r:id="rId7"/>
+    <p:sldId id="264" r:id="rId2"/>
+    <p:sldId id="263" r:id="rId3"/>
   </p:sldIdLst>
   <p:sldSz cx="12192000" cy="6858000"/>
   <p:notesSz cx="6797675" cy="9872663"/>
@@ -3331,466 +3327,6 @@
           <a:chExt cx="0" cy="0"/>
         </a:xfrm>
       </p:grpSpPr>
-      <p:sp>
-        <p:nvSpPr>
-          <p:cNvPr id="4" name="Rectangle : coins arrondis 3">
-            <a:extLst>
-              <a:ext uri="{FF2B5EF4-FFF2-40B4-BE49-F238E27FC236}">
-                <a16:creationId xmlns:a16="http://schemas.microsoft.com/office/drawing/2014/main" id="{DE6A7BE5-6E8F-4BA8-BA78-751F9B1BEE12}"/>
-              </a:ext>
-            </a:extLst>
-          </p:cNvPr>
-          <p:cNvSpPr/>
-          <p:nvPr/>
-        </p:nvSpPr>
-        <p:spPr>
-          <a:xfrm>
-            <a:off x="3870960" y="2392680"/>
-            <a:ext cx="1783080" cy="739140"/>
-          </a:xfrm>
-          <a:prstGeom prst="roundRect">
-            <a:avLst/>
-          </a:prstGeom>
-          <a:noFill/>
-          <a:ln>
-            <a:solidFill>
-              <a:schemeClr val="tx1"/>
-            </a:solidFill>
-          </a:ln>
-        </p:spPr>
-        <p:style>
-          <a:lnRef idx="2">
-            <a:schemeClr val="accent1">
-              <a:shade val="50000"/>
-            </a:schemeClr>
-          </a:lnRef>
-          <a:fillRef idx="1">
-            <a:schemeClr val="accent1"/>
-          </a:fillRef>
-          <a:effectRef idx="0">
-            <a:schemeClr val="accent1"/>
-          </a:effectRef>
-          <a:fontRef idx="minor">
-            <a:schemeClr val="lt1"/>
-          </a:fontRef>
-        </p:style>
-        <p:txBody>
-          <a:bodyPr rtlCol="0" anchor="ctr"/>
-          <a:lstStyle/>
-          <a:p>
-            <a:pPr algn="ctr"/>
-            <a:r>
-              <a:rPr lang="fr-FR" sz="1600" b="1" dirty="0">
-                <a:solidFill>
-                  <a:schemeClr val="tx1"/>
-                </a:solidFill>
-              </a:rPr>
-              <a:t>SPTG </a:t>
-            </a:r>
-            <a:r>
-              <a:rPr lang="fr-FR" sz="1600" b="1">
-                <a:solidFill>
-                  <a:schemeClr val="tx1"/>
-                </a:solidFill>
-              </a:rPr>
-              <a:t>tool</a:t>
-            </a:r>
-            <a:endParaRPr lang="fr-FR" sz="1600" b="1" dirty="0">
-              <a:solidFill>
-                <a:schemeClr val="tx1"/>
-              </a:solidFill>
-            </a:endParaRPr>
-          </a:p>
-        </p:txBody>
-      </p:sp>
-      <p:sp>
-        <p:nvSpPr>
-          <p:cNvPr id="5" name="Rectangle 4">
-            <a:extLst>
-              <a:ext uri="{FF2B5EF4-FFF2-40B4-BE49-F238E27FC236}">
-                <a16:creationId xmlns:a16="http://schemas.microsoft.com/office/drawing/2014/main" id="{FAFFDD8C-9BE5-4AEA-9366-C1D75CD57E16}"/>
-              </a:ext>
-            </a:extLst>
-          </p:cNvPr>
-          <p:cNvSpPr/>
-          <p:nvPr/>
-        </p:nvSpPr>
-        <p:spPr>
-          <a:xfrm>
-            <a:off x="1181100" y="1771650"/>
-            <a:ext cx="2148840" cy="678180"/>
-          </a:xfrm>
-          <a:prstGeom prst="rect">
-            <a:avLst/>
-          </a:prstGeom>
-          <a:noFill/>
-          <a:ln>
-            <a:solidFill>
-              <a:schemeClr val="tx1"/>
-            </a:solidFill>
-          </a:ln>
-        </p:spPr>
-        <p:style>
-          <a:lnRef idx="2">
-            <a:schemeClr val="accent1">
-              <a:shade val="50000"/>
-            </a:schemeClr>
-          </a:lnRef>
-          <a:fillRef idx="1">
-            <a:schemeClr val="accent1"/>
-          </a:fillRef>
-          <a:effectRef idx="0">
-            <a:schemeClr val="accent1"/>
-          </a:effectRef>
-          <a:fontRef idx="minor">
-            <a:schemeClr val="lt1"/>
-          </a:fontRef>
-        </p:style>
-        <p:txBody>
-          <a:bodyPr rtlCol="0" anchor="ctr"/>
-          <a:lstStyle/>
-          <a:p>
-            <a:pPr algn="ctr"/>
-            <a:r>
-              <a:rPr lang="fr-FR" sz="1600" b="1" dirty="0">
-                <a:solidFill>
-                  <a:schemeClr val="tx1"/>
-                </a:solidFill>
-              </a:rPr>
-              <a:t>Input 1 : </a:t>
-            </a:r>
-          </a:p>
-          <a:p>
-            <a:pPr algn="ctr"/>
-            <a:r>
-              <a:rPr lang="fr-FR" sz="1600" b="1" dirty="0">
-                <a:solidFill>
-                  <a:schemeClr val="tx1"/>
-                </a:solidFill>
-              </a:rPr>
-              <a:t>Reference model</a:t>
-            </a:r>
-          </a:p>
-        </p:txBody>
-      </p:sp>
-      <p:sp>
-        <p:nvSpPr>
-          <p:cNvPr id="6" name="Rectangle 5">
-            <a:extLst>
-              <a:ext uri="{FF2B5EF4-FFF2-40B4-BE49-F238E27FC236}">
-                <a16:creationId xmlns:a16="http://schemas.microsoft.com/office/drawing/2014/main" id="{BF990D4B-BA47-4914-88A7-2D96A2E5F1F9}"/>
-              </a:ext>
-            </a:extLst>
-          </p:cNvPr>
-          <p:cNvSpPr/>
-          <p:nvPr/>
-        </p:nvSpPr>
-        <p:spPr>
-          <a:xfrm>
-            <a:off x="1181100" y="2952750"/>
-            <a:ext cx="2148840" cy="678180"/>
-          </a:xfrm>
-          <a:prstGeom prst="rect">
-            <a:avLst/>
-          </a:prstGeom>
-          <a:noFill/>
-          <a:ln>
-            <a:solidFill>
-              <a:schemeClr val="tx1"/>
-            </a:solidFill>
-          </a:ln>
-        </p:spPr>
-        <p:style>
-          <a:lnRef idx="2">
-            <a:schemeClr val="accent1">
-              <a:shade val="50000"/>
-            </a:schemeClr>
-          </a:lnRef>
-          <a:fillRef idx="1">
-            <a:schemeClr val="accent1"/>
-          </a:fillRef>
-          <a:effectRef idx="0">
-            <a:schemeClr val="accent1"/>
-          </a:effectRef>
-          <a:fontRef idx="minor">
-            <a:schemeClr val="lt1"/>
-          </a:fontRef>
-        </p:style>
-        <p:txBody>
-          <a:bodyPr rtlCol="0" anchor="ctr"/>
-          <a:lstStyle/>
-          <a:p>
-            <a:pPr algn="ctr"/>
-            <a:r>
-              <a:rPr lang="fr-FR" sz="1600" b="1" dirty="0">
-                <a:solidFill>
-                  <a:schemeClr val="tx1"/>
-                </a:solidFill>
-              </a:rPr>
-              <a:t>Input 2 :</a:t>
-            </a:r>
-          </a:p>
-          <a:p>
-            <a:pPr algn="ctr"/>
-            <a:r>
-              <a:rPr lang="fr-FR" sz="1600" b="1" dirty="0">
-                <a:solidFill>
-                  <a:schemeClr val="tx1"/>
-                </a:solidFill>
-              </a:rPr>
-              <a:t>Test </a:t>
-            </a:r>
-            <a:r>
-              <a:rPr lang="fr-FR" sz="1600" b="1" dirty="0" err="1">
-                <a:solidFill>
-                  <a:schemeClr val="tx1"/>
-                </a:solidFill>
-              </a:rPr>
-              <a:t>purpose</a:t>
-            </a:r>
-            <a:endParaRPr lang="fr-FR" sz="1600" b="1" dirty="0">
-              <a:solidFill>
-                <a:schemeClr val="tx1"/>
-              </a:solidFill>
-            </a:endParaRPr>
-          </a:p>
-        </p:txBody>
-      </p:sp>
-      <p:sp>
-        <p:nvSpPr>
-          <p:cNvPr id="7" name="Rectangle 6">
-            <a:extLst>
-              <a:ext uri="{FF2B5EF4-FFF2-40B4-BE49-F238E27FC236}">
-                <a16:creationId xmlns:a16="http://schemas.microsoft.com/office/drawing/2014/main" id="{1B1A0852-9FDE-47F6-BEB5-D799CCDBB4C9}"/>
-              </a:ext>
-            </a:extLst>
-          </p:cNvPr>
-          <p:cNvSpPr/>
-          <p:nvPr/>
-        </p:nvSpPr>
-        <p:spPr>
-          <a:xfrm>
-            <a:off x="6537962" y="2423160"/>
-            <a:ext cx="2148840" cy="678180"/>
-          </a:xfrm>
-          <a:prstGeom prst="rect">
-            <a:avLst/>
-          </a:prstGeom>
-          <a:noFill/>
-          <a:ln>
-            <a:solidFill>
-              <a:schemeClr val="tx1"/>
-            </a:solidFill>
-          </a:ln>
-        </p:spPr>
-        <p:style>
-          <a:lnRef idx="2">
-            <a:schemeClr val="accent1">
-              <a:shade val="50000"/>
-            </a:schemeClr>
-          </a:lnRef>
-          <a:fillRef idx="1">
-            <a:schemeClr val="accent1"/>
-          </a:fillRef>
-          <a:effectRef idx="0">
-            <a:schemeClr val="accent1"/>
-          </a:effectRef>
-          <a:fontRef idx="minor">
-            <a:schemeClr val="lt1"/>
-          </a:fontRef>
-        </p:style>
-        <p:txBody>
-          <a:bodyPr rtlCol="0" anchor="ctr"/>
-          <a:lstStyle/>
-          <a:p>
-            <a:pPr algn="ctr"/>
-            <a:r>
-              <a:rPr lang="fr-FR" sz="1600" b="1" dirty="0">
-                <a:solidFill>
-                  <a:schemeClr val="tx1"/>
-                </a:solidFill>
-              </a:rPr>
-              <a:t>Output :</a:t>
-            </a:r>
-          </a:p>
-          <a:p>
-            <a:pPr algn="ctr"/>
-            <a:r>
-              <a:rPr lang="fr-FR" sz="1600" b="1" dirty="0">
-                <a:solidFill>
-                  <a:schemeClr val="tx1"/>
-                </a:solidFill>
-              </a:rPr>
-              <a:t>Test case</a:t>
-            </a:r>
-          </a:p>
-        </p:txBody>
-      </p:sp>
-      <p:cxnSp>
-        <p:nvCxnSpPr>
-          <p:cNvPr id="9" name="Connecteur droit avec flèche 8">
-            <a:extLst>
-              <a:ext uri="{FF2B5EF4-FFF2-40B4-BE49-F238E27FC236}">
-                <a16:creationId xmlns:a16="http://schemas.microsoft.com/office/drawing/2014/main" id="{411A1A46-59AF-4FCF-AB3B-C8D03B2EB3E2}"/>
-              </a:ext>
-            </a:extLst>
-          </p:cNvPr>
-          <p:cNvCxnSpPr>
-            <a:stCxn id="5" idx="3"/>
-            <a:endCxn id="4" idx="1"/>
-          </p:cNvCxnSpPr>
-          <p:nvPr/>
-        </p:nvCxnSpPr>
-        <p:spPr>
-          <a:xfrm>
-            <a:off x="3329940" y="2110740"/>
-            <a:ext cx="541020" cy="651510"/>
-          </a:xfrm>
-          <a:prstGeom prst="straightConnector1">
-            <a:avLst/>
-          </a:prstGeom>
-          <a:ln w="12700">
-            <a:solidFill>
-              <a:schemeClr val="tx1"/>
-            </a:solidFill>
-            <a:tailEnd type="triangle" w="med" len="lg"/>
-          </a:ln>
-        </p:spPr>
-        <p:style>
-          <a:lnRef idx="1">
-            <a:schemeClr val="accent1"/>
-          </a:lnRef>
-          <a:fillRef idx="0">
-            <a:schemeClr val="accent1"/>
-          </a:fillRef>
-          <a:effectRef idx="0">
-            <a:schemeClr val="accent1"/>
-          </a:effectRef>
-          <a:fontRef idx="minor">
-            <a:schemeClr val="tx1"/>
-          </a:fontRef>
-        </p:style>
-      </p:cxnSp>
-      <p:cxnSp>
-        <p:nvCxnSpPr>
-          <p:cNvPr id="11" name="Connecteur droit avec flèche 10">
-            <a:extLst>
-              <a:ext uri="{FF2B5EF4-FFF2-40B4-BE49-F238E27FC236}">
-                <a16:creationId xmlns:a16="http://schemas.microsoft.com/office/drawing/2014/main" id="{1FADF16E-5014-43BB-9950-2B2A8582DA28}"/>
-              </a:ext>
-            </a:extLst>
-          </p:cNvPr>
-          <p:cNvCxnSpPr>
-            <a:stCxn id="6" idx="3"/>
-            <a:endCxn id="4" idx="1"/>
-          </p:cNvCxnSpPr>
-          <p:nvPr/>
-        </p:nvCxnSpPr>
-        <p:spPr>
-          <a:xfrm flipV="1">
-            <a:off x="3329940" y="2762250"/>
-            <a:ext cx="541020" cy="529590"/>
-          </a:xfrm>
-          <a:prstGeom prst="straightConnector1">
-            <a:avLst/>
-          </a:prstGeom>
-          <a:ln w="12700">
-            <a:solidFill>
-              <a:schemeClr val="tx1"/>
-            </a:solidFill>
-            <a:tailEnd type="triangle" w="med" len="lg"/>
-          </a:ln>
-        </p:spPr>
-        <p:style>
-          <a:lnRef idx="1">
-            <a:schemeClr val="accent1"/>
-          </a:lnRef>
-          <a:fillRef idx="0">
-            <a:schemeClr val="accent1"/>
-          </a:fillRef>
-          <a:effectRef idx="0">
-            <a:schemeClr val="accent1"/>
-          </a:effectRef>
-          <a:fontRef idx="minor">
-            <a:schemeClr val="tx1"/>
-          </a:fontRef>
-        </p:style>
-      </p:cxnSp>
-      <p:cxnSp>
-        <p:nvCxnSpPr>
-          <p:cNvPr id="13" name="Connecteur droit avec flèche 12">
-            <a:extLst>
-              <a:ext uri="{FF2B5EF4-FFF2-40B4-BE49-F238E27FC236}">
-                <a16:creationId xmlns:a16="http://schemas.microsoft.com/office/drawing/2014/main" id="{C137407B-041D-4849-9457-365104C114BF}"/>
-              </a:ext>
-            </a:extLst>
-          </p:cNvPr>
-          <p:cNvCxnSpPr>
-            <a:stCxn id="4" idx="3"/>
-            <a:endCxn id="7" idx="1"/>
-          </p:cNvCxnSpPr>
-          <p:nvPr/>
-        </p:nvCxnSpPr>
-        <p:spPr>
-          <a:xfrm>
-            <a:off x="5654040" y="2762250"/>
-            <a:ext cx="883922" cy="0"/>
-          </a:xfrm>
-          <a:prstGeom prst="straightConnector1">
-            <a:avLst/>
-          </a:prstGeom>
-          <a:ln w="12700">
-            <a:solidFill>
-              <a:schemeClr val="tx1"/>
-            </a:solidFill>
-            <a:tailEnd type="triangle" w="med" len="lg"/>
-          </a:ln>
-        </p:spPr>
-        <p:style>
-          <a:lnRef idx="1">
-            <a:schemeClr val="accent1"/>
-          </a:lnRef>
-          <a:fillRef idx="0">
-            <a:schemeClr val="accent1"/>
-          </a:fillRef>
-          <a:effectRef idx="0">
-            <a:schemeClr val="accent1"/>
-          </a:effectRef>
-          <a:fontRef idx="minor">
-            <a:schemeClr val="tx1"/>
-          </a:fontRef>
-        </p:style>
-      </p:cxnSp>
-    </p:spTree>
-    <p:extLst>
-      <p:ext uri="{BB962C8B-B14F-4D97-AF65-F5344CB8AC3E}">
-        <p14:creationId xmlns:p14="http://schemas.microsoft.com/office/powerpoint/2010/main" val="3143165597"/>
-      </p:ext>
-    </p:extLst>
-  </p:cSld>
-  <p:clrMapOvr>
-    <a:masterClrMapping/>
-  </p:clrMapOvr>
-</p:sld>
-</file>
-
-<file path=ppt/slides/slide2.xml><?xml version="1.0" encoding="utf-8"?>
-<p:sld xmlns:a="http://schemas.openxmlformats.org/drawingml/2006/main" xmlns:r="http://schemas.openxmlformats.org/officeDocument/2006/relationships" xmlns:p="http://schemas.openxmlformats.org/presentationml/2006/main">
-  <p:cSld>
-    <p:spTree>
-      <p:nvGrpSpPr>
-        <p:cNvPr id="1" name=""/>
-        <p:cNvGrpSpPr/>
-        <p:nvPr/>
-      </p:nvGrpSpPr>
-      <p:grpSpPr>
-        <a:xfrm>
-          <a:off x="0" y="0"/>
-          <a:ext cx="0" cy="0"/>
-          <a:chOff x="0" y="0"/>
-          <a:chExt cx="0" cy="0"/>
-        </a:xfrm>
-      </p:grpSpPr>
       <p:cxnSp>
         <p:nvCxnSpPr>
           <p:cNvPr id="99" name="Connecteur droit avec flèche 98">
@@ -3809,7 +3345,7 @@
         </p:nvCxnSpPr>
         <p:spPr>
           <a:xfrm flipV="1">
-            <a:off x="7385377" y="4621661"/>
+            <a:off x="6022403" y="4587156"/>
             <a:ext cx="377197" cy="1793"/>
           </a:xfrm>
           <a:prstGeom prst="straightConnector1">
@@ -3864,7 +3400,7 @@
         </p:nvCxnSpPr>
         <p:spPr>
           <a:xfrm flipH="1" flipV="1">
-            <a:off x="7268464" y="4261391"/>
+            <a:off x="5905490" y="4226886"/>
             <a:ext cx="1" cy="239330"/>
           </a:xfrm>
           <a:prstGeom prst="straightConnector1">
@@ -3915,7 +3451,7 @@
         </p:nvSpPr>
         <p:spPr>
           <a:xfrm>
-            <a:off x="7762574" y="4500721"/>
+            <a:off x="6399600" y="4466216"/>
             <a:ext cx="566365" cy="241880"/>
           </a:xfrm>
           <a:prstGeom prst="rect">
@@ -4012,7 +3548,7 @@
         </p:nvCxnSpPr>
         <p:spPr>
           <a:xfrm flipH="1">
-            <a:off x="7268464" y="4746186"/>
+            <a:off x="5905490" y="4711681"/>
             <a:ext cx="1" cy="270592"/>
           </a:xfrm>
           <a:prstGeom prst="straightConnector1">
@@ -4067,7 +3603,7 @@
         </p:nvCxnSpPr>
         <p:spPr>
           <a:xfrm flipV="1">
-            <a:off x="6699270" y="4623454"/>
+            <a:off x="5336296" y="4588949"/>
             <a:ext cx="452282" cy="1"/>
           </a:xfrm>
           <a:prstGeom prst="straightConnector1">
@@ -4120,7 +3656,7 @@
         </p:nvCxnSpPr>
         <p:spPr>
           <a:xfrm>
-            <a:off x="6164570" y="4631765"/>
+            <a:off x="4801596" y="4597260"/>
             <a:ext cx="283809" cy="1276"/>
           </a:xfrm>
           <a:prstGeom prst="straightConnector1">
@@ -4173,7 +3709,7 @@
         </p:nvSpPr>
         <p:spPr>
           <a:xfrm>
-            <a:off x="6465445" y="4500722"/>
+            <a:off x="5102471" y="4466217"/>
             <a:ext cx="233825" cy="245465"/>
           </a:xfrm>
           <a:prstGeom prst="rect">
@@ -4231,7 +3767,7 @@
         </p:nvSpPr>
         <p:spPr>
           <a:xfrm>
-            <a:off x="7151552" y="4500721"/>
+            <a:off x="5788578" y="4466216"/>
             <a:ext cx="233825" cy="245465"/>
           </a:xfrm>
           <a:prstGeom prst="rect">
@@ -4287,7 +3823,7 @@
         </p:nvSpPr>
         <p:spPr>
           <a:xfrm>
-            <a:off x="7007904" y="5016778"/>
+            <a:off x="5644930" y="4982273"/>
             <a:ext cx="521119" cy="261175"/>
           </a:xfrm>
           <a:prstGeom prst="rect">
@@ -4381,7 +3917,7 @@
         </p:nvSpPr>
         <p:spPr>
           <a:xfrm>
-            <a:off x="7007904" y="4000216"/>
+            <a:off x="5644930" y="3965711"/>
             <a:ext cx="521119" cy="261175"/>
           </a:xfrm>
           <a:prstGeom prst="rect">
@@ -4479,7 +4015,7 @@
         </p:nvCxnSpPr>
         <p:spPr>
           <a:xfrm flipV="1">
-            <a:off x="6582358" y="4260075"/>
+            <a:off x="5219384" y="4225570"/>
             <a:ext cx="9303" cy="240647"/>
           </a:xfrm>
           <a:prstGeom prst="straightConnector1">
@@ -4530,7 +4066,7 @@
         </p:nvSpPr>
         <p:spPr>
           <a:xfrm>
-            <a:off x="6331101" y="3998900"/>
+            <a:off x="4968127" y="3964395"/>
             <a:ext cx="521119" cy="261175"/>
           </a:xfrm>
           <a:prstGeom prst="rect">
@@ -4628,7 +4164,7 @@
         </p:nvCxnSpPr>
         <p:spPr>
           <a:xfrm flipH="1">
-            <a:off x="6582357" y="4746187"/>
+            <a:off x="5219383" y="4711682"/>
             <a:ext cx="1" cy="262736"/>
           </a:xfrm>
           <a:prstGeom prst="straightConnector1">
@@ -4679,7 +4215,7 @@
         </p:nvSpPr>
         <p:spPr>
           <a:xfrm>
-            <a:off x="6321797" y="5008923"/>
+            <a:off x="4958823" y="4974418"/>
             <a:ext cx="521119" cy="261175"/>
           </a:xfrm>
           <a:prstGeom prst="rect">
@@ -4773,7 +4309,7 @@
         </p:nvSpPr>
         <p:spPr>
           <a:xfrm>
-            <a:off x="6290102" y="3678897"/>
+            <a:off x="4927128" y="3644392"/>
             <a:ext cx="1504188" cy="369414"/>
           </a:xfrm>
           <a:prstGeom prst="rect">
@@ -4832,7 +4368,7 @@
         </p:nvSpPr>
         <p:spPr>
           <a:xfrm>
-            <a:off x="6383826" y="2754162"/>
+            <a:off x="5020852" y="2719657"/>
             <a:ext cx="1248156" cy="517398"/>
           </a:xfrm>
           <a:prstGeom prst="roundRect">
@@ -4915,7 +4451,7 @@
         </p:nvCxnSpPr>
         <p:spPr>
           <a:xfrm flipH="1">
-            <a:off x="7007904" y="2175737"/>
+            <a:off x="5644930" y="2141232"/>
             <a:ext cx="949742" cy="578425"/>
           </a:xfrm>
           <a:prstGeom prst="straightConnector1">
@@ -4960,7 +4496,7 @@
         </p:nvCxnSpPr>
         <p:spPr>
           <a:xfrm>
-            <a:off x="6059662" y="2237664"/>
+            <a:off x="4696688" y="2203159"/>
             <a:ext cx="948242" cy="516498"/>
           </a:xfrm>
           <a:prstGeom prst="straightConnector1">
@@ -5005,7 +4541,7 @@
         </p:nvCxnSpPr>
         <p:spPr>
           <a:xfrm>
-            <a:off x="7007904" y="3271560"/>
+            <a:off x="5644930" y="3237055"/>
             <a:ext cx="0" cy="479506"/>
           </a:xfrm>
           <a:prstGeom prst="straightConnector1">
@@ -5047,7 +4583,7 @@
         </p:nvSpPr>
         <p:spPr>
           <a:xfrm>
-            <a:off x="4907906" y="1301595"/>
+            <a:off x="3544932" y="1267090"/>
             <a:ext cx="1862789" cy="415498"/>
           </a:xfrm>
           <a:prstGeom prst="rect">
@@ -5102,7 +4638,7 @@
         </p:nvSpPr>
         <p:spPr>
           <a:xfrm>
-            <a:off x="7549469" y="1234494"/>
+            <a:off x="6186495" y="1199989"/>
             <a:ext cx="1504188" cy="474726"/>
           </a:xfrm>
           <a:prstGeom prst="rect">
@@ -5195,7 +4731,7 @@
         </p:nvCxnSpPr>
         <p:spPr>
           <a:xfrm>
-            <a:off x="5605846" y="2012250"/>
+            <a:off x="4242872" y="1977745"/>
             <a:ext cx="6810" cy="556507"/>
           </a:xfrm>
           <a:prstGeom prst="straightConnector1">
@@ -5250,7 +4786,7 @@
         </p:nvCxnSpPr>
         <p:spPr>
           <a:xfrm flipV="1">
-            <a:off x="5722758" y="1889517"/>
+            <a:off x="4359784" y="1855012"/>
             <a:ext cx="452282" cy="1"/>
           </a:xfrm>
           <a:prstGeom prst="straightConnector1">
@@ -5301,7 +4837,7 @@
         </p:nvSpPr>
         <p:spPr>
           <a:xfrm>
-            <a:off x="5488933" y="2041036"/>
+            <a:off x="4125959" y="2006531"/>
             <a:ext cx="78842" cy="495048"/>
           </a:xfrm>
           <a:custGeom>
@@ -5410,7 +4946,7 @@
         </p:nvSpPr>
         <p:spPr>
           <a:xfrm>
-            <a:off x="5166968" y="2036273"/>
+            <a:off x="3803994" y="2001768"/>
             <a:ext cx="297507" cy="504573"/>
           </a:xfrm>
           <a:custGeom>
@@ -5517,7 +5053,7 @@
         </p:nvCxnSpPr>
         <p:spPr>
           <a:xfrm>
-            <a:off x="5188058" y="1897828"/>
+            <a:off x="3825084" y="1863323"/>
             <a:ext cx="283809" cy="1276"/>
           </a:xfrm>
           <a:prstGeom prst="straightConnector1">
@@ -5570,7 +5106,7 @@
         </p:nvSpPr>
         <p:spPr>
           <a:xfrm>
-            <a:off x="5488933" y="1766785"/>
+            <a:off x="4125959" y="1732280"/>
             <a:ext cx="233825" cy="245465"/>
           </a:xfrm>
           <a:prstGeom prst="rect">
@@ -5632,7 +5168,7 @@
         </p:nvSpPr>
         <p:spPr>
           <a:xfrm>
-            <a:off x="5495743" y="2568757"/>
+            <a:off x="4132769" y="2534252"/>
             <a:ext cx="233825" cy="245465"/>
           </a:xfrm>
           <a:prstGeom prst="rect">
@@ -5690,7 +5226,7 @@
         </p:nvSpPr>
         <p:spPr>
           <a:xfrm>
-            <a:off x="6175040" y="1766784"/>
+            <a:off x="4812066" y="1732279"/>
             <a:ext cx="233825" cy="245465"/>
           </a:xfrm>
           <a:prstGeom prst="rect">
@@ -5746,7 +5282,7 @@
         </p:nvSpPr>
         <p:spPr>
           <a:xfrm>
-            <a:off x="5567775" y="2076070"/>
+            <a:off x="4204801" y="2041565"/>
             <a:ext cx="438660" cy="276999"/>
           </a:xfrm>
           <a:prstGeom prst="rect">
@@ -5798,7 +5334,7 @@
         </p:nvSpPr>
         <p:spPr>
           <a:xfrm>
-            <a:off x="5197329" y="2163510"/>
+            <a:off x="3834355" y="2129005"/>
             <a:ext cx="384059" cy="276999"/>
           </a:xfrm>
           <a:prstGeom prst="rect">
@@ -5861,7 +5397,7 @@
         </p:nvCxnSpPr>
         <p:spPr>
           <a:xfrm flipV="1">
-            <a:off x="7717245" y="1942045"/>
+            <a:off x="6354271" y="1907540"/>
             <a:ext cx="452282" cy="1"/>
           </a:xfrm>
           <a:prstGeom prst="straightConnector1">
@@ -5914,7 +5450,7 @@
         </p:nvCxnSpPr>
         <p:spPr>
           <a:xfrm>
-            <a:off x="7182545" y="1950356"/>
+            <a:off x="5819571" y="1915851"/>
             <a:ext cx="283809" cy="1276"/>
           </a:xfrm>
           <a:prstGeom prst="straightConnector1">
@@ -5967,7 +5503,7 @@
         </p:nvSpPr>
         <p:spPr>
           <a:xfrm>
-            <a:off x="7483420" y="1819313"/>
+            <a:off x="6120446" y="1784808"/>
             <a:ext cx="233825" cy="245465"/>
           </a:xfrm>
           <a:prstGeom prst="rect">
@@ -6025,7 +5561,7 @@
         </p:nvSpPr>
         <p:spPr>
           <a:xfrm>
-            <a:off x="8169527" y="1819312"/>
+            <a:off x="6806553" y="1784807"/>
             <a:ext cx="233825" cy="245465"/>
           </a:xfrm>
           <a:prstGeom prst="rect">
@@ -6081,7 +5617,7 @@
         </p:nvSpPr>
         <p:spPr>
           <a:xfrm>
-            <a:off x="5451561" y="1745144"/>
+            <a:off x="4088587" y="1710639"/>
             <a:ext cx="438660" cy="276999"/>
           </a:xfrm>
           <a:prstGeom prst="rect">
@@ -6140,7 +5676,7 @@
         </p:nvSpPr>
         <p:spPr>
           <a:xfrm>
-            <a:off x="5448281" y="2536084"/>
+            <a:off x="4085307" y="2501579"/>
             <a:ext cx="438660" cy="276999"/>
           </a:xfrm>
           <a:prstGeom prst="rect">
@@ -6192,7 +5728,7 @@
         </p:nvSpPr>
         <p:spPr>
           <a:xfrm>
-            <a:off x="7438568" y="1789089"/>
+            <a:off x="6075594" y="1754584"/>
             <a:ext cx="438660" cy="276999"/>
           </a:xfrm>
           <a:prstGeom prst="rect">
@@ -6244,7 +5780,7 @@
         </p:nvSpPr>
         <p:spPr>
           <a:xfrm>
-            <a:off x="8109402" y="1771178"/>
+            <a:off x="6746428" y="1736673"/>
             <a:ext cx="438660" cy="276999"/>
           </a:xfrm>
           <a:prstGeom prst="rect">
@@ -6299,7 +5835,7 @@
         </p:nvCxnSpPr>
         <p:spPr>
           <a:xfrm flipV="1">
-            <a:off x="8388079" y="1922046"/>
+            <a:off x="7025105" y="1887541"/>
             <a:ext cx="452282" cy="1"/>
           </a:xfrm>
           <a:prstGeom prst="straightConnector1">
@@ -6352,7 +5888,7 @@
         </p:nvSpPr>
         <p:spPr>
           <a:xfrm>
-            <a:off x="8840361" y="1799313"/>
+            <a:off x="7477387" y="1764808"/>
             <a:ext cx="233825" cy="245465"/>
           </a:xfrm>
           <a:prstGeom prst="rect">
@@ -6408,7 +5944,7 @@
         </p:nvSpPr>
         <p:spPr>
           <a:xfrm>
-            <a:off x="8780236" y="1751179"/>
+            <a:off x="7417262" y="1716674"/>
             <a:ext cx="438660" cy="276999"/>
           </a:xfrm>
           <a:prstGeom prst="rect">
@@ -6460,7 +5996,7 @@
         </p:nvSpPr>
         <p:spPr>
           <a:xfrm>
-            <a:off x="8443496" y="1632678"/>
+            <a:off x="7080522" y="1598173"/>
             <a:ext cx="384059" cy="276999"/>
           </a:xfrm>
           <a:prstGeom prst="rect">
@@ -6512,7 +6048,7 @@
         </p:nvSpPr>
         <p:spPr>
           <a:xfrm>
-            <a:off x="7757484" y="1632110"/>
+            <a:off x="6394510" y="1597605"/>
             <a:ext cx="438660" cy="276999"/>
           </a:xfrm>
           <a:prstGeom prst="rect">
@@ -6564,7 +6100,7 @@
         </p:nvSpPr>
         <p:spPr>
           <a:xfrm>
-            <a:off x="6122395" y="1735250"/>
+            <a:off x="4759421" y="1700745"/>
             <a:ext cx="438660" cy="276999"/>
           </a:xfrm>
           <a:prstGeom prst="rect">
@@ -6630,7 +6166,7 @@
         </p:blipFill>
         <p:spPr>
           <a:xfrm flipV="1">
-            <a:off x="7350214" y="2792182"/>
+            <a:off x="5987240" y="2757677"/>
             <a:ext cx="232279" cy="232572"/>
           </a:xfrm>
           <a:prstGeom prst="rect">
@@ -6654,7 +6190,7 @@
 </p:sld>
 </file>
 
-<file path=ppt/slides/slide3.xml><?xml version="1.0" encoding="utf-8"?>
+<file path=ppt/slides/slide2.xml><?xml version="1.0" encoding="utf-8"?>
 <p:sld xmlns:a="http://schemas.openxmlformats.org/drawingml/2006/main" xmlns:r="http://schemas.openxmlformats.org/officeDocument/2006/relationships" xmlns:p="http://schemas.openxmlformats.org/presentationml/2006/main">
   <p:cSld>
     <p:spTree>
@@ -6673,10 +6209,10 @@
       </p:grpSpPr>
       <p:sp>
         <p:nvSpPr>
-          <p:cNvPr id="154" name="Rectangle 153">
-            <a:extLst>
-              <a:ext uri="{FF2B5EF4-FFF2-40B4-BE49-F238E27FC236}">
-                <a16:creationId xmlns:a16="http://schemas.microsoft.com/office/drawing/2014/main" id="{6E8DD859-2B6B-4C8F-9847-DDF5C01A669A}"/>
+          <p:cNvPr id="243" name="Rectangle : coins arrondis 242">
+            <a:extLst>
+              <a:ext uri="{FF2B5EF4-FFF2-40B4-BE49-F238E27FC236}">
+                <a16:creationId xmlns:a16="http://schemas.microsoft.com/office/drawing/2014/main" id="{1302E793-5999-4A8D-93CA-B964B9265626}"/>
               </a:ext>
             </a:extLst>
           </p:cNvPr>
@@ -6685,154 +6221,10 @@
         </p:nvSpPr>
         <p:spPr>
           <a:xfrm>
-            <a:off x="1020989" y="3057525"/>
-            <a:ext cx="4775566" cy="3518991"/>
-          </a:xfrm>
-          <a:prstGeom prst="rect">
-            <a:avLst/>
-          </a:prstGeom>
-          <a:solidFill>
-            <a:schemeClr val="bg1"/>
-          </a:solidFill>
-          <a:ln>
-            <a:solidFill>
-              <a:schemeClr val="tx1"/>
-            </a:solidFill>
-          </a:ln>
-        </p:spPr>
-        <p:style>
-          <a:lnRef idx="2">
-            <a:schemeClr val="accent1">
-              <a:shade val="50000"/>
-            </a:schemeClr>
-          </a:lnRef>
-          <a:fillRef idx="1">
-            <a:schemeClr val="accent1"/>
-          </a:fillRef>
-          <a:effectRef idx="0">
-            <a:schemeClr val="accent1"/>
-          </a:effectRef>
-          <a:fontRef idx="minor">
-            <a:schemeClr val="lt1"/>
-          </a:fontRef>
-        </p:style>
-        <p:txBody>
-          <a:bodyPr rtlCol="0" anchor="ctr"/>
-          <a:lstStyle/>
-          <a:p>
-            <a:pPr algn="ctr"/>
-            <a:endParaRPr lang="fr-FR" sz="1050"/>
-          </a:p>
-        </p:txBody>
-      </p:sp>
-      <p:sp>
-        <p:nvSpPr>
-          <p:cNvPr id="13" name="Rectangle 12">
-            <a:extLst>
-              <a:ext uri="{FF2B5EF4-FFF2-40B4-BE49-F238E27FC236}">
-                <a16:creationId xmlns:a16="http://schemas.microsoft.com/office/drawing/2014/main" id="{4A4D1E30-B17A-4C58-BE26-AE40A3317DDF}"/>
-              </a:ext>
-            </a:extLst>
-          </p:cNvPr>
-          <p:cNvSpPr/>
-          <p:nvPr/>
-        </p:nvSpPr>
-        <p:spPr>
-          <a:xfrm>
-            <a:off x="9645724" y="3554687"/>
-            <a:ext cx="1527369" cy="1652867"/>
-          </a:xfrm>
-          <a:prstGeom prst="rect">
-            <a:avLst/>
-          </a:prstGeom>
-          <a:solidFill>
-            <a:schemeClr val="tx1"/>
-          </a:solidFill>
-          <a:ln>
-            <a:solidFill>
-              <a:schemeClr val="tx1"/>
-            </a:solidFill>
-          </a:ln>
-          <a:effectLst>
-            <a:outerShdw blurRad="50800" dist="38100" dir="2700000" algn="tl" rotWithShape="0">
-              <a:prstClr val="black">
-                <a:alpha val="40000"/>
-              </a:prstClr>
-            </a:outerShdw>
-          </a:effectLst>
-        </p:spPr>
-        <p:style>
-          <a:lnRef idx="2">
-            <a:schemeClr val="accent1">
-              <a:shade val="50000"/>
-            </a:schemeClr>
-          </a:lnRef>
-          <a:fillRef idx="1">
-            <a:schemeClr val="accent1"/>
-          </a:fillRef>
-          <a:effectRef idx="0">
-            <a:schemeClr val="accent1"/>
-          </a:effectRef>
-          <a:fontRef idx="minor">
-            <a:schemeClr val="lt1"/>
-          </a:fontRef>
-        </p:style>
-        <p:txBody>
-          <a:bodyPr rtlCol="0" anchor="ctr"/>
-          <a:lstStyle/>
-          <a:p>
-            <a:pPr algn="ctr"/>
-            <a:r>
-              <a:rPr lang="fr-FR" sz="1050" b="1" dirty="0">
-                <a:solidFill>
-                  <a:schemeClr val="bg1"/>
-                </a:solidFill>
-                <a:latin typeface="Times New Roman" panose="02020603050405020304" pitchFamily="18" charset="0"/>
-                <a:cs typeface="Times New Roman" panose="02020603050405020304" pitchFamily="18" charset="0"/>
-              </a:rPr>
-              <a:t>System Under Test</a:t>
-            </a:r>
-          </a:p>
-          <a:p>
-            <a:pPr algn="ctr"/>
-            <a:r>
-              <a:rPr lang="fr-FR" sz="1050" b="1" dirty="0">
-                <a:solidFill>
-                  <a:schemeClr val="bg1"/>
-                </a:solidFill>
-                <a:latin typeface="Times New Roman" panose="02020603050405020304" pitchFamily="18" charset="0"/>
-                <a:cs typeface="Times New Roman" panose="02020603050405020304" pitchFamily="18" charset="0"/>
-              </a:rPr>
-              <a:t>(SUT)</a:t>
-            </a:r>
-            <a:endParaRPr lang="en-US" sz="1050" b="1" dirty="0">
-              <a:solidFill>
-                <a:schemeClr val="bg1"/>
-              </a:solidFill>
-              <a:latin typeface="Times New Roman" panose="02020603050405020304" pitchFamily="18" charset="0"/>
-              <a:cs typeface="Times New Roman" panose="02020603050405020304" pitchFamily="18" charset="0"/>
-            </a:endParaRPr>
-          </a:p>
-        </p:txBody>
-      </p:sp>
-      <p:sp>
-        <p:nvSpPr>
-          <p:cNvPr id="19" name="Rectangle 18">
-            <a:extLst>
-              <a:ext uri="{FF2B5EF4-FFF2-40B4-BE49-F238E27FC236}">
-                <a16:creationId xmlns:a16="http://schemas.microsoft.com/office/drawing/2014/main" id="{0C4EA08F-BD9B-4F25-B173-312315FD92B4}"/>
-              </a:ext>
-            </a:extLst>
-          </p:cNvPr>
-          <p:cNvSpPr/>
-          <p:nvPr/>
-        </p:nvSpPr>
-        <p:spPr>
-          <a:xfrm>
-            <a:off x="6201662" y="3457099"/>
-            <a:ext cx="1692620" cy="1750455"/>
-          </a:xfrm>
-          <a:prstGeom prst="rect">
+            <a:off x="6186671" y="3457842"/>
+            <a:ext cx="1740105" cy="1750456"/>
+          </a:xfrm>
+          <a:prstGeom prst="roundRect">
             <a:avLst/>
           </a:prstGeom>
           <a:solidFill>
@@ -6872,11 +6264,65 @@
           <a:lstStyle/>
           <a:p>
             <a:pPr algn="ctr"/>
-            <a:endParaRPr lang="fr-FR" sz="1050" b="1" dirty="0">
+            <a:endParaRPr lang="fr-FR" sz="1050" b="1">
               <a:solidFill>
                 <a:schemeClr val="bg1"/>
               </a:solidFill>
             </a:endParaRPr>
+          </a:p>
+        </p:txBody>
+      </p:sp>
+      <p:sp>
+        <p:nvSpPr>
+          <p:cNvPr id="154" name="Rectangle 153">
+            <a:extLst>
+              <a:ext uri="{FF2B5EF4-FFF2-40B4-BE49-F238E27FC236}">
+                <a16:creationId xmlns:a16="http://schemas.microsoft.com/office/drawing/2014/main" id="{6E8DD859-2B6B-4C8F-9847-DDF5C01A669A}"/>
+              </a:ext>
+            </a:extLst>
+          </p:cNvPr>
+          <p:cNvSpPr/>
+          <p:nvPr/>
+        </p:nvSpPr>
+        <p:spPr>
+          <a:xfrm>
+            <a:off x="1020989" y="3057525"/>
+            <a:ext cx="4775566" cy="3518991"/>
+          </a:xfrm>
+          <a:prstGeom prst="rect">
+            <a:avLst/>
+          </a:prstGeom>
+          <a:solidFill>
+            <a:schemeClr val="bg1"/>
+          </a:solidFill>
+          <a:ln>
+            <a:solidFill>
+              <a:schemeClr val="tx1"/>
+            </a:solidFill>
+          </a:ln>
+        </p:spPr>
+        <p:style>
+          <a:lnRef idx="2">
+            <a:schemeClr val="accent1">
+              <a:shade val="50000"/>
+            </a:schemeClr>
+          </a:lnRef>
+          <a:fillRef idx="1">
+            <a:schemeClr val="accent1"/>
+          </a:fillRef>
+          <a:effectRef idx="0">
+            <a:schemeClr val="accent1"/>
+          </a:effectRef>
+          <a:fontRef idx="minor">
+            <a:schemeClr val="lt1"/>
+          </a:fontRef>
+        </p:style>
+        <p:txBody>
+          <a:bodyPr rtlCol="0" anchor="ctr"/>
+          <a:lstStyle/>
+          <a:p>
+            <a:pPr algn="ctr"/>
+            <a:endParaRPr lang="fr-FR" sz="1050"/>
           </a:p>
         </p:txBody>
       </p:sp>
@@ -8573,7 +8019,6 @@
           </p:cNvPr>
           <p:cNvCxnSpPr>
             <a:cxnSpLocks/>
-            <a:stCxn id="19" idx="2"/>
             <a:endCxn id="147" idx="0"/>
           </p:cNvCxnSpPr>
           <p:nvPr/>
@@ -11659,7 +11104,7 @@
         </p:nvCxnSpPr>
         <p:spPr>
           <a:xfrm flipH="1" flipV="1">
-            <a:off x="3364764" y="4265721"/>
+            <a:off x="3364764" y="4275247"/>
             <a:ext cx="1" cy="239330"/>
           </a:xfrm>
           <a:prstGeom prst="straightConnector1">
@@ -11841,42 +11286,12 @@
           </a:ln>
         </p:spPr>
       </p:pic>
-    </p:spTree>
-    <p:extLst>
-      <p:ext uri="{BB962C8B-B14F-4D97-AF65-F5344CB8AC3E}">
-        <p14:creationId xmlns:p14="http://schemas.microsoft.com/office/powerpoint/2010/main" val="4072077103"/>
-      </p:ext>
-    </p:extLst>
-  </p:cSld>
-  <p:clrMapOvr>
-    <a:masterClrMapping/>
-  </p:clrMapOvr>
-</p:sld>
-</file>
-
-<file path=ppt/slides/slide4.xml><?xml version="1.0" encoding="utf-8"?>
-<p:sld xmlns:a="http://schemas.openxmlformats.org/drawingml/2006/main" xmlns:r="http://schemas.openxmlformats.org/officeDocument/2006/relationships" xmlns:p="http://schemas.openxmlformats.org/presentationml/2006/main">
-  <p:cSld>
-    <p:spTree>
-      <p:nvGrpSpPr>
-        <p:cNvPr id="1" name=""/>
-        <p:cNvGrpSpPr/>
-        <p:nvPr/>
-      </p:nvGrpSpPr>
-      <p:grpSpPr>
-        <a:xfrm>
-          <a:off x="0" y="0"/>
-          <a:ext cx="0" cy="0"/>
-          <a:chOff x="0" y="0"/>
-          <a:chExt cx="0" cy="0"/>
-        </a:xfrm>
-      </p:grpSpPr>
-      <p:sp>
-        <p:nvSpPr>
-          <p:cNvPr id="154" name="Rectangle 153">
-            <a:extLst>
-              <a:ext uri="{FF2B5EF4-FFF2-40B4-BE49-F238E27FC236}">
-                <a16:creationId xmlns:a16="http://schemas.microsoft.com/office/drawing/2014/main" id="{6E8DD859-2B6B-4C8F-9847-DDF5C01A669A}"/>
+      <p:sp>
+        <p:nvSpPr>
+          <p:cNvPr id="244" name="Rectangle : coins arrondis 243">
+            <a:extLst>
+              <a:ext uri="{FF2B5EF4-FFF2-40B4-BE49-F238E27FC236}">
+                <a16:creationId xmlns:a16="http://schemas.microsoft.com/office/drawing/2014/main" id="{5C60F198-DC59-4647-8A16-245E2574FB44}"/>
               </a:ext>
             </a:extLst>
           </p:cNvPr>
@@ -11885,149 +11300,19 @@
         </p:nvSpPr>
         <p:spPr>
           <a:xfrm>
-            <a:off x="-2591054" y="2123186"/>
-            <a:ext cx="6894637" cy="4645713"/>
-          </a:xfrm>
-          <a:prstGeom prst="rect">
+            <a:off x="9647055" y="3457842"/>
+            <a:ext cx="1740105" cy="1750456"/>
+          </a:xfrm>
+          <a:prstGeom prst="roundRect">
             <a:avLst/>
           </a:prstGeom>
           <a:solidFill>
-            <a:schemeClr val="accent1">
-              <a:lumMod val="20000"/>
-              <a:lumOff val="80000"/>
-            </a:schemeClr>
+            <a:schemeClr val="tx1"/>
           </a:solidFill>
           <a:ln>
             <a:solidFill>
               <a:schemeClr val="tx1"/>
             </a:solidFill>
-          </a:ln>
-        </p:spPr>
-        <p:style>
-          <a:lnRef idx="2">
-            <a:schemeClr val="accent1">
-              <a:shade val="50000"/>
-            </a:schemeClr>
-          </a:lnRef>
-          <a:fillRef idx="1">
-            <a:schemeClr val="accent1"/>
-          </a:fillRef>
-          <a:effectRef idx="0">
-            <a:schemeClr val="accent1"/>
-          </a:effectRef>
-          <a:fontRef idx="minor">
-            <a:schemeClr val="lt1"/>
-          </a:fontRef>
-        </p:style>
-        <p:txBody>
-          <a:bodyPr rtlCol="0" anchor="ctr"/>
-          <a:lstStyle/>
-          <a:p>
-            <a:pPr algn="ctr"/>
-            <a:endParaRPr lang="fr-FR"/>
-          </a:p>
-        </p:txBody>
-      </p:sp>
-      <p:sp>
-        <p:nvSpPr>
-          <p:cNvPr id="5" name="Rectangle 4">
-            <a:extLst>
-              <a:ext uri="{FF2B5EF4-FFF2-40B4-BE49-F238E27FC236}">
-                <a16:creationId xmlns:a16="http://schemas.microsoft.com/office/drawing/2014/main" id="{16644979-F45A-4E26-85EC-87E8F4DDD769}"/>
-              </a:ext>
-            </a:extLst>
-          </p:cNvPr>
-          <p:cNvSpPr/>
-          <p:nvPr/>
-        </p:nvSpPr>
-        <p:spPr>
-          <a:xfrm>
-            <a:off x="4088663" y="537703"/>
-            <a:ext cx="2148840" cy="678180"/>
-          </a:xfrm>
-          <a:prstGeom prst="rect">
-            <a:avLst/>
-          </a:prstGeom>
-          <a:solidFill>
-            <a:schemeClr val="accent1">
-              <a:lumMod val="20000"/>
-              <a:lumOff val="80000"/>
-            </a:schemeClr>
-          </a:solidFill>
-          <a:ln>
-            <a:solidFill>
-              <a:schemeClr val="tx1"/>
-            </a:solidFill>
-          </a:ln>
-        </p:spPr>
-        <p:style>
-          <a:lnRef idx="2">
-            <a:schemeClr val="accent1">
-              <a:shade val="50000"/>
-            </a:schemeClr>
-          </a:lnRef>
-          <a:fillRef idx="1">
-            <a:schemeClr val="accent1"/>
-          </a:fillRef>
-          <a:effectRef idx="0">
-            <a:schemeClr val="accent1"/>
-          </a:effectRef>
-          <a:fontRef idx="minor">
-            <a:schemeClr val="lt1"/>
-          </a:fontRef>
-        </p:style>
-        <p:txBody>
-          <a:bodyPr rtlCol="0" anchor="ctr"/>
-          <a:lstStyle/>
-          <a:p>
-            <a:pPr algn="ctr"/>
-            <a:r>
-              <a:rPr lang="fr-FR" sz="1600" b="1" dirty="0">
-                <a:solidFill>
-                  <a:schemeClr val="tx1"/>
-                </a:solidFill>
-              </a:rPr>
-              <a:t>Input 1 : </a:t>
-            </a:r>
-          </a:p>
-          <a:p>
-            <a:pPr algn="ctr"/>
-            <a:r>
-              <a:rPr lang="fr-FR" sz="1600" b="1" dirty="0">
-                <a:solidFill>
-                  <a:schemeClr val="tx1"/>
-                </a:solidFill>
-              </a:rPr>
-              <a:t>Reference model</a:t>
-            </a:r>
-          </a:p>
-        </p:txBody>
-      </p:sp>
-      <p:sp>
-        <p:nvSpPr>
-          <p:cNvPr id="13" name="Rectangle 12">
-            <a:extLst>
-              <a:ext uri="{FF2B5EF4-FFF2-40B4-BE49-F238E27FC236}">
-                <a16:creationId xmlns:a16="http://schemas.microsoft.com/office/drawing/2014/main" id="{4A4D1E30-B17A-4C58-BE26-AE40A3317DDF}"/>
-              </a:ext>
-            </a:extLst>
-          </p:cNvPr>
-          <p:cNvSpPr/>
-          <p:nvPr/>
-        </p:nvSpPr>
-        <p:spPr>
-          <a:xfrm>
-            <a:off x="9817705" y="3220005"/>
-            <a:ext cx="2181956" cy="2361238"/>
-          </a:xfrm>
-          <a:prstGeom prst="rect">
-            <a:avLst/>
-          </a:prstGeom>
-          <a:solidFill>
-            <a:schemeClr val="tx1"/>
-          </a:solidFill>
-          <a:ln>
-            <a:noFill/>
           </a:ln>
           <a:effectLst>
             <a:outerShdw blurRad="50800" dist="38100" dir="2700000" algn="tl" rotWithShape="0">
@@ -12059,454 +11344,31 @@
           <a:p>
             <a:pPr algn="ctr"/>
             <a:r>
-              <a:rPr lang="fr-FR" b="1" dirty="0">
+              <a:rPr lang="fr-FR" sz="1050" b="1">
                 <a:solidFill>
                   <a:schemeClr val="bg1"/>
                 </a:solidFill>
+                <a:latin typeface="Times New Roman" panose="02020603050405020304" pitchFamily="18" charset="0"/>
+                <a:cs typeface="Times New Roman" panose="02020603050405020304" pitchFamily="18" charset="0"/>
               </a:rPr>
-              <a:t>SUT</a:t>
-            </a:r>
-            <a:endParaRPr lang="en-US" b="1" dirty="0">
+              <a:t>System Under Test</a:t>
+            </a:r>
+          </a:p>
+          <a:p>
+            <a:pPr algn="ctr"/>
+            <a:r>
+              <a:rPr lang="fr-FR" sz="1050" b="1">
+                <a:solidFill>
+                  <a:schemeClr val="bg1"/>
+                </a:solidFill>
+                <a:latin typeface="Times New Roman" panose="02020603050405020304" pitchFamily="18" charset="0"/>
+                <a:cs typeface="Times New Roman" panose="02020603050405020304" pitchFamily="18" charset="0"/>
+              </a:rPr>
+              <a:t>(SUT)</a:t>
+            </a:r>
+            <a:endParaRPr lang="en-US" sz="1050" b="1" dirty="0">
               <a:solidFill>
                 <a:schemeClr val="bg1"/>
-              </a:solidFill>
-            </a:endParaRPr>
-          </a:p>
-        </p:txBody>
-      </p:sp>
-      <p:sp>
-        <p:nvSpPr>
-          <p:cNvPr id="18" name="Rectangle 17">
-            <a:extLst>
-              <a:ext uri="{FF2B5EF4-FFF2-40B4-BE49-F238E27FC236}">
-                <a16:creationId xmlns:a16="http://schemas.microsoft.com/office/drawing/2014/main" id="{9CA4F5BE-9E20-4E3C-A01B-483447BC7EBD}"/>
-              </a:ext>
-            </a:extLst>
-          </p:cNvPr>
-          <p:cNvSpPr/>
-          <p:nvPr/>
-        </p:nvSpPr>
-        <p:spPr>
-          <a:xfrm>
-            <a:off x="6523627" y="537703"/>
-            <a:ext cx="2148840" cy="678180"/>
-          </a:xfrm>
-          <a:prstGeom prst="rect">
-            <a:avLst/>
-          </a:prstGeom>
-          <a:solidFill>
-            <a:schemeClr val="accent1">
-              <a:lumMod val="20000"/>
-              <a:lumOff val="80000"/>
-            </a:schemeClr>
-          </a:solidFill>
-          <a:ln>
-            <a:solidFill>
-              <a:schemeClr val="tx1"/>
-            </a:solidFill>
-          </a:ln>
-        </p:spPr>
-        <p:style>
-          <a:lnRef idx="2">
-            <a:schemeClr val="accent1">
-              <a:shade val="50000"/>
-            </a:schemeClr>
-          </a:lnRef>
-          <a:fillRef idx="1">
-            <a:schemeClr val="accent1"/>
-          </a:fillRef>
-          <a:effectRef idx="0">
-            <a:schemeClr val="accent1"/>
-          </a:effectRef>
-          <a:fontRef idx="minor">
-            <a:schemeClr val="lt1"/>
-          </a:fontRef>
-        </p:style>
-        <p:txBody>
-          <a:bodyPr rtlCol="0" anchor="ctr"/>
-          <a:lstStyle/>
-          <a:p>
-            <a:pPr algn="ctr"/>
-            <a:r>
-              <a:rPr lang="fr-FR" sz="1600" b="1" dirty="0">
-                <a:solidFill>
-                  <a:schemeClr val="tx1"/>
-                </a:solidFill>
-              </a:rPr>
-              <a:t>Input 2 :</a:t>
-            </a:r>
-          </a:p>
-          <a:p>
-            <a:pPr algn="ctr"/>
-            <a:r>
-              <a:rPr lang="fr-FR" sz="1600" b="1" dirty="0">
-                <a:solidFill>
-                  <a:schemeClr val="tx1"/>
-                </a:solidFill>
-              </a:rPr>
-              <a:t>Test </a:t>
-            </a:r>
-            <a:r>
-              <a:rPr lang="fr-FR" sz="1600" b="1" dirty="0" err="1">
-                <a:solidFill>
-                  <a:schemeClr val="tx1"/>
-                </a:solidFill>
-              </a:rPr>
-              <a:t>purpose</a:t>
-            </a:r>
-            <a:endParaRPr lang="fr-FR" sz="1600" b="1" dirty="0">
-              <a:solidFill>
-                <a:schemeClr val="tx1"/>
-              </a:solidFill>
-            </a:endParaRPr>
-          </a:p>
-        </p:txBody>
-      </p:sp>
-      <p:sp>
-        <p:nvSpPr>
-          <p:cNvPr id="19" name="Rectangle 18">
-            <a:extLst>
-              <a:ext uri="{FF2B5EF4-FFF2-40B4-BE49-F238E27FC236}">
-                <a16:creationId xmlns:a16="http://schemas.microsoft.com/office/drawing/2014/main" id="{0C4EA08F-BD9B-4F25-B173-312315FD92B4}"/>
-              </a:ext>
-            </a:extLst>
-          </p:cNvPr>
-          <p:cNvSpPr/>
-          <p:nvPr/>
-        </p:nvSpPr>
-        <p:spPr>
-          <a:xfrm>
-            <a:off x="4986072" y="3220005"/>
-            <a:ext cx="2418029" cy="2361238"/>
-          </a:xfrm>
-          <a:prstGeom prst="rect">
-            <a:avLst/>
-          </a:prstGeom>
-          <a:noFill/>
-          <a:ln>
-            <a:solidFill>
-              <a:schemeClr val="tx1"/>
-            </a:solidFill>
-          </a:ln>
-        </p:spPr>
-        <p:style>
-          <a:lnRef idx="2">
-            <a:schemeClr val="accent1">
-              <a:shade val="50000"/>
-            </a:schemeClr>
-          </a:lnRef>
-          <a:fillRef idx="1">
-            <a:schemeClr val="accent1"/>
-          </a:fillRef>
-          <a:effectRef idx="0">
-            <a:schemeClr val="accent1"/>
-          </a:effectRef>
-          <a:fontRef idx="minor">
-            <a:schemeClr val="lt1"/>
-          </a:fontRef>
-        </p:style>
-        <p:txBody>
-          <a:bodyPr rtlCol="0" anchor="ctr"/>
-          <a:lstStyle/>
-          <a:p>
-            <a:pPr algn="ctr"/>
-            <a:endParaRPr lang="fr-FR" sz="1600" b="1" dirty="0">
-              <a:solidFill>
-                <a:schemeClr val="tx1"/>
-              </a:solidFill>
-            </a:endParaRPr>
-          </a:p>
-        </p:txBody>
-      </p:sp>
-      <p:sp>
-        <p:nvSpPr>
-          <p:cNvPr id="25" name="Rectangle : coins arrondis 24">
-            <a:extLst>
-              <a:ext uri="{FF2B5EF4-FFF2-40B4-BE49-F238E27FC236}">
-                <a16:creationId xmlns:a16="http://schemas.microsoft.com/office/drawing/2014/main" id="{AE6A85AD-1BE2-4FDF-9F7F-B5AAAC7C1D6C}"/>
-              </a:ext>
-            </a:extLst>
-          </p:cNvPr>
-          <p:cNvSpPr/>
-          <p:nvPr/>
-        </p:nvSpPr>
-        <p:spPr>
-          <a:xfrm>
-            <a:off x="5298886" y="1944317"/>
-            <a:ext cx="1783080" cy="739140"/>
-          </a:xfrm>
-          <a:prstGeom prst="roundRect">
-            <a:avLst/>
-          </a:prstGeom>
-          <a:solidFill>
-            <a:schemeClr val="accent1">
-              <a:lumMod val="20000"/>
-              <a:lumOff val="80000"/>
-            </a:schemeClr>
-          </a:solidFill>
-          <a:ln>
-            <a:solidFill>
-              <a:schemeClr val="tx1"/>
-            </a:solidFill>
-          </a:ln>
-        </p:spPr>
-        <p:style>
-          <a:lnRef idx="2">
-            <a:schemeClr val="accent1">
-              <a:shade val="50000"/>
-            </a:schemeClr>
-          </a:lnRef>
-          <a:fillRef idx="1">
-            <a:schemeClr val="accent1"/>
-          </a:fillRef>
-          <a:effectRef idx="0">
-            <a:schemeClr val="accent1"/>
-          </a:effectRef>
-          <a:fontRef idx="minor">
-            <a:schemeClr val="lt1"/>
-          </a:fontRef>
-        </p:style>
-        <p:txBody>
-          <a:bodyPr rtlCol="0" anchor="ctr"/>
-          <a:lstStyle/>
-          <a:p>
-            <a:pPr algn="ctr"/>
-            <a:r>
-              <a:rPr lang="fr-FR" sz="1600" b="1" dirty="0">
-                <a:solidFill>
-                  <a:schemeClr val="tx1"/>
-                </a:solidFill>
-              </a:rPr>
-              <a:t>SPTG </a:t>
-            </a:r>
-            <a:r>
-              <a:rPr lang="fr-FR" sz="1600" b="1">
-                <a:solidFill>
-                  <a:schemeClr val="tx1"/>
-                </a:solidFill>
-              </a:rPr>
-              <a:t>tool</a:t>
-            </a:r>
-            <a:endParaRPr lang="fr-FR" sz="1600" b="1" dirty="0">
-              <a:solidFill>
-                <a:schemeClr val="tx1"/>
-              </a:solidFill>
-            </a:endParaRPr>
-          </a:p>
-        </p:txBody>
-      </p:sp>
-      <p:cxnSp>
-        <p:nvCxnSpPr>
-          <p:cNvPr id="31" name="Connecteur droit avec flèche 30">
-            <a:extLst>
-              <a:ext uri="{FF2B5EF4-FFF2-40B4-BE49-F238E27FC236}">
-                <a16:creationId xmlns:a16="http://schemas.microsoft.com/office/drawing/2014/main" id="{C61D0422-0A8E-41A9-9D25-9750796D565A}"/>
-              </a:ext>
-            </a:extLst>
-          </p:cNvPr>
-          <p:cNvCxnSpPr>
-            <a:cxnSpLocks/>
-            <a:stCxn id="18" idx="2"/>
-            <a:endCxn id="25" idx="0"/>
-          </p:cNvCxnSpPr>
-          <p:nvPr/>
-        </p:nvCxnSpPr>
-        <p:spPr>
-          <a:xfrm flipH="1">
-            <a:off x="6190426" y="1215883"/>
-            <a:ext cx="1407621" cy="728434"/>
-          </a:xfrm>
-          <a:prstGeom prst="straightConnector1">
-            <a:avLst/>
-          </a:prstGeom>
-          <a:ln w="12700">
-            <a:solidFill>
-              <a:schemeClr val="tx1"/>
-            </a:solidFill>
-            <a:tailEnd type="triangle" w="med" len="lg"/>
-          </a:ln>
-        </p:spPr>
-        <p:style>
-          <a:lnRef idx="1">
-            <a:schemeClr val="accent1"/>
-          </a:lnRef>
-          <a:fillRef idx="0">
-            <a:schemeClr val="accent1"/>
-          </a:fillRef>
-          <a:effectRef idx="0">
-            <a:schemeClr val="accent1"/>
-          </a:effectRef>
-          <a:fontRef idx="minor">
-            <a:schemeClr val="tx1"/>
-          </a:fontRef>
-        </p:style>
-      </p:cxnSp>
-      <p:cxnSp>
-        <p:nvCxnSpPr>
-          <p:cNvPr id="32" name="Connecteur droit avec flèche 31">
-            <a:extLst>
-              <a:ext uri="{FF2B5EF4-FFF2-40B4-BE49-F238E27FC236}">
-                <a16:creationId xmlns:a16="http://schemas.microsoft.com/office/drawing/2014/main" id="{8637FFDA-D3DF-4A49-B0B7-B62A7C0102B5}"/>
-              </a:ext>
-            </a:extLst>
-          </p:cNvPr>
-          <p:cNvCxnSpPr>
-            <a:cxnSpLocks/>
-            <a:stCxn id="5" idx="2"/>
-            <a:endCxn id="25" idx="0"/>
-          </p:cNvCxnSpPr>
-          <p:nvPr/>
-        </p:nvCxnSpPr>
-        <p:spPr>
-          <a:xfrm>
-            <a:off x="5163083" y="1215883"/>
-            <a:ext cx="1027343" cy="728434"/>
-          </a:xfrm>
-          <a:prstGeom prst="straightConnector1">
-            <a:avLst/>
-          </a:prstGeom>
-          <a:ln w="12700">
-            <a:solidFill>
-              <a:schemeClr val="tx1"/>
-            </a:solidFill>
-            <a:tailEnd type="triangle" w="med" len="lg"/>
-          </a:ln>
-        </p:spPr>
-        <p:style>
-          <a:lnRef idx="1">
-            <a:schemeClr val="accent1"/>
-          </a:lnRef>
-          <a:fillRef idx="0">
-            <a:schemeClr val="accent1"/>
-          </a:fillRef>
-          <a:effectRef idx="0">
-            <a:schemeClr val="accent1"/>
-          </a:effectRef>
-          <a:fontRef idx="minor">
-            <a:schemeClr val="tx1"/>
-          </a:fontRef>
-        </p:style>
-      </p:cxnSp>
-      <p:cxnSp>
-        <p:nvCxnSpPr>
-          <p:cNvPr id="39" name="Connecteur droit avec flèche 38">
-            <a:extLst>
-              <a:ext uri="{FF2B5EF4-FFF2-40B4-BE49-F238E27FC236}">
-                <a16:creationId xmlns:a16="http://schemas.microsoft.com/office/drawing/2014/main" id="{D4365703-9839-42ED-9ACE-30B72175C720}"/>
-              </a:ext>
-            </a:extLst>
-          </p:cNvPr>
-          <p:cNvCxnSpPr>
-            <a:cxnSpLocks/>
-            <a:stCxn id="25" idx="2"/>
-            <a:endCxn id="137" idx="0"/>
-          </p:cNvCxnSpPr>
-          <p:nvPr/>
-        </p:nvCxnSpPr>
-        <p:spPr>
-          <a:xfrm>
-            <a:off x="6190426" y="2683457"/>
-            <a:ext cx="0" cy="685009"/>
-          </a:xfrm>
-          <a:prstGeom prst="straightConnector1">
-            <a:avLst/>
-          </a:prstGeom>
-          <a:ln w="12700">
-            <a:solidFill>
-              <a:schemeClr val="tx1"/>
-            </a:solidFill>
-            <a:tailEnd type="triangle" w="med" len="lg"/>
-          </a:ln>
-        </p:spPr>
-        <p:style>
-          <a:lnRef idx="1">
-            <a:schemeClr val="accent1"/>
-          </a:lnRef>
-          <a:fillRef idx="0">
-            <a:schemeClr val="accent1"/>
-          </a:fillRef>
-          <a:effectRef idx="0">
-            <a:schemeClr val="accent1"/>
-          </a:effectRef>
-          <a:fontRef idx="minor">
-            <a:schemeClr val="tx1"/>
-          </a:fontRef>
-        </p:style>
-      </p:cxnSp>
-      <p:cxnSp>
-        <p:nvCxnSpPr>
-          <p:cNvPr id="57" name="Connecteur droit avec flèche 56">
-            <a:extLst>
-              <a:ext uri="{FF2B5EF4-FFF2-40B4-BE49-F238E27FC236}">
-                <a16:creationId xmlns:a16="http://schemas.microsoft.com/office/drawing/2014/main" id="{CF1351E3-3DEC-4B28-A741-969055E668BB}"/>
-              </a:ext>
-            </a:extLst>
-          </p:cNvPr>
-          <p:cNvCxnSpPr/>
-          <p:nvPr/>
-        </p:nvCxnSpPr>
-        <p:spPr>
-          <a:xfrm>
-            <a:off x="7453109" y="3505262"/>
-            <a:ext cx="2306677" cy="4764"/>
-          </a:xfrm>
-          <a:prstGeom prst="straightConnector1">
-            <a:avLst/>
-          </a:prstGeom>
-          <a:noFill/>
-          <a:ln w="6350" cap="flat" cmpd="sng" algn="ctr">
-            <a:solidFill>
-              <a:srgbClr val="262626"/>
-            </a:solidFill>
-            <a:prstDash val="lgDashDot"/>
-            <a:miter lim="800000"/>
-            <a:tailEnd type="triangle" w="lg" len="lg"/>
-          </a:ln>
-          <a:effectLst/>
-        </p:spPr>
-      </p:cxnSp>
-      <p:sp>
-        <p:nvSpPr>
-          <p:cNvPr id="58" name="ZoneTexte 57">
-            <a:extLst>
-              <a:ext uri="{FF2B5EF4-FFF2-40B4-BE49-F238E27FC236}">
-                <a16:creationId xmlns:a16="http://schemas.microsoft.com/office/drawing/2014/main" id="{10BB8DDE-648F-48BF-9306-BBF1B15DBC39}"/>
-              </a:ext>
-            </a:extLst>
-          </p:cNvPr>
-          <p:cNvSpPr txBox="1"/>
-          <p:nvPr/>
-        </p:nvSpPr>
-        <p:spPr>
-          <a:xfrm>
-            <a:off x="7303373" y="3106063"/>
-            <a:ext cx="2437277" cy="369332"/>
-          </a:xfrm>
-          <a:prstGeom prst="rect">
-            <a:avLst/>
-          </a:prstGeom>
-          <a:noFill/>
-        </p:spPr>
-        <p:txBody>
-          <a:bodyPr wrap="square" rtlCol="0">
-            <a:spAutoFit/>
-          </a:bodyPr>
-          <a:lstStyle/>
-          <a:p>
-            <a:pPr algn="ctr"/>
-            <a:r>
-              <a:rPr lang="fr-FR" kern="0" dirty="0">
-                <a:solidFill>
-                  <a:srgbClr val="262626"/>
-                </a:solidFill>
-                <a:latin typeface="Times New Roman" panose="02020603050405020304" pitchFamily="18" charset="0"/>
-                <a:cs typeface="Times New Roman" panose="02020603050405020304" pitchFamily="18" charset="0"/>
-              </a:rPr>
-              <a:t>In! 5 @ 0 time</a:t>
-            </a:r>
-            <a:endParaRPr lang="fr-FR" sz="2000" kern="0" dirty="0">
-              <a:solidFill>
-                <a:srgbClr val="262626"/>
               </a:solidFill>
               <a:latin typeface="Times New Roman" panose="02020603050405020304" pitchFamily="18" charset="0"/>
               <a:cs typeface="Times New Roman" panose="02020603050405020304" pitchFamily="18" charset="0"/>
@@ -12514,2385 +11376,10 @@
           </a:p>
         </p:txBody>
       </p:sp>
-      <p:pic>
-        <p:nvPicPr>
-          <p:cNvPr id="59" name="Image 58">
-            <a:extLst>
-              <a:ext uri="{FF2B5EF4-FFF2-40B4-BE49-F238E27FC236}">
-                <a16:creationId xmlns:a16="http://schemas.microsoft.com/office/drawing/2014/main" id="{38E29E08-4332-4B1B-A2A4-F46D0DBCCA85}"/>
-              </a:ext>
-            </a:extLst>
-          </p:cNvPr>
-          <p:cNvPicPr>
-            <a:picLocks noChangeAspect="1"/>
-          </p:cNvPicPr>
-          <p:nvPr/>
-        </p:nvPicPr>
-        <p:blipFill>
-          <a:blip r:embed="rId2" cstate="print">
-            <a:extLst>
-              <a:ext uri="{28A0092B-C50C-407E-A947-70E740481C1C}">
-                <a14:useLocalDpi xmlns:a14="http://schemas.microsoft.com/office/drawing/2010/main" val="0"/>
-              </a:ext>
-            </a:extLst>
-          </a:blip>
-          <a:stretch>
-            <a:fillRect/>
-          </a:stretch>
-        </p:blipFill>
-        <p:spPr>
-          <a:xfrm>
-            <a:off x="5387982" y="4170962"/>
-            <a:ext cx="440394" cy="566057"/>
-          </a:xfrm>
-          <a:prstGeom prst="rect">
-            <a:avLst/>
-          </a:prstGeom>
-        </p:spPr>
-      </p:pic>
-      <p:cxnSp>
-        <p:nvCxnSpPr>
-          <p:cNvPr id="60" name="Connecteur droit avec flèche 59">
-            <a:extLst>
-              <a:ext uri="{FF2B5EF4-FFF2-40B4-BE49-F238E27FC236}">
-                <a16:creationId xmlns:a16="http://schemas.microsoft.com/office/drawing/2014/main" id="{80DA3B3A-39F7-4676-A091-2F89767FF7F4}"/>
-              </a:ext>
-            </a:extLst>
-          </p:cNvPr>
-          <p:cNvCxnSpPr/>
-          <p:nvPr/>
-        </p:nvCxnSpPr>
-        <p:spPr>
-          <a:xfrm>
-            <a:off x="7392084" y="4469668"/>
-            <a:ext cx="2306677" cy="4764"/>
-          </a:xfrm>
-          <a:prstGeom prst="straightConnector1">
-            <a:avLst/>
-          </a:prstGeom>
-          <a:noFill/>
-          <a:ln w="6350" cap="flat" cmpd="sng" algn="ctr">
-            <a:solidFill>
-              <a:srgbClr val="FF0000"/>
-            </a:solidFill>
-            <a:prstDash val="lgDashDot"/>
-            <a:miter lim="800000"/>
-            <a:headEnd type="triangle" w="med" len="med"/>
-            <a:tailEnd type="none" w="med" len="med"/>
-          </a:ln>
-          <a:effectLst/>
-        </p:spPr>
-      </p:cxnSp>
-      <p:sp>
-        <p:nvSpPr>
-          <p:cNvPr id="61" name="ZoneTexte 60">
-            <a:extLst>
-              <a:ext uri="{FF2B5EF4-FFF2-40B4-BE49-F238E27FC236}">
-                <a16:creationId xmlns:a16="http://schemas.microsoft.com/office/drawing/2014/main" id="{5A9CEA62-F72A-49A9-8160-87214456F971}"/>
-              </a:ext>
-            </a:extLst>
-          </p:cNvPr>
-          <p:cNvSpPr txBox="1"/>
-          <p:nvPr/>
-        </p:nvSpPr>
-        <p:spPr>
-          <a:xfrm>
-            <a:off x="7334345" y="4076711"/>
-            <a:ext cx="2437277" cy="369332"/>
-          </a:xfrm>
-          <a:prstGeom prst="rect">
-            <a:avLst/>
-          </a:prstGeom>
-          <a:noFill/>
-        </p:spPr>
-        <p:txBody>
-          <a:bodyPr wrap="square" rtlCol="0">
-            <a:spAutoFit/>
-          </a:bodyPr>
-          <a:lstStyle/>
-          <a:p>
-            <a:pPr algn="ctr"/>
-            <a:r>
-              <a:rPr lang="fr-FR" kern="0" dirty="0">
-                <a:solidFill>
-                  <a:srgbClr val="FF0000"/>
-                </a:solidFill>
-                <a:latin typeface="Times New Roman" panose="02020603050405020304" pitchFamily="18" charset="0"/>
-                <a:cs typeface="Times New Roman" panose="02020603050405020304" pitchFamily="18" charset="0"/>
-              </a:rPr>
-              <a:t>Out? 0 @ </a:t>
-            </a:r>
-            <a:r>
-              <a:rPr lang="fr-FR" u="sng" kern="0" dirty="0">
-                <a:solidFill>
-                  <a:srgbClr val="FF0000"/>
-                </a:solidFill>
-                <a:latin typeface="Times New Roman" panose="02020603050405020304" pitchFamily="18" charset="0"/>
-                <a:cs typeface="Times New Roman" panose="02020603050405020304" pitchFamily="18" charset="0"/>
-              </a:rPr>
-              <a:t>42</a:t>
-            </a:r>
-            <a:r>
-              <a:rPr lang="fr-FR" kern="0" dirty="0">
-                <a:solidFill>
-                  <a:srgbClr val="FF0000"/>
-                </a:solidFill>
-                <a:latin typeface="Times New Roman" panose="02020603050405020304" pitchFamily="18" charset="0"/>
-                <a:cs typeface="Times New Roman" panose="02020603050405020304" pitchFamily="18" charset="0"/>
-              </a:rPr>
-              <a:t> time</a:t>
-            </a:r>
-            <a:endParaRPr lang="fr-FR" sz="2000" kern="0" dirty="0">
-              <a:solidFill>
-                <a:srgbClr val="FF0000"/>
-              </a:solidFill>
-              <a:latin typeface="Times New Roman" panose="02020603050405020304" pitchFamily="18" charset="0"/>
-              <a:cs typeface="Times New Roman" panose="02020603050405020304" pitchFamily="18" charset="0"/>
-            </a:endParaRPr>
-          </a:p>
-        </p:txBody>
-      </p:sp>
-      <p:cxnSp>
-        <p:nvCxnSpPr>
-          <p:cNvPr id="62" name="Connecteur droit avec flèche 61">
-            <a:extLst>
-              <a:ext uri="{FF2B5EF4-FFF2-40B4-BE49-F238E27FC236}">
-                <a16:creationId xmlns:a16="http://schemas.microsoft.com/office/drawing/2014/main" id="{50F048E0-1304-4AA1-9D8C-031A2020E3FC}"/>
-              </a:ext>
-            </a:extLst>
-          </p:cNvPr>
-          <p:cNvCxnSpPr/>
-          <p:nvPr/>
-        </p:nvCxnSpPr>
-        <p:spPr>
-          <a:xfrm>
-            <a:off x="7392084" y="3952834"/>
-            <a:ext cx="2306677" cy="4764"/>
-          </a:xfrm>
-          <a:prstGeom prst="straightConnector1">
-            <a:avLst/>
-          </a:prstGeom>
-          <a:noFill/>
-          <a:ln w="6350" cap="flat" cmpd="sng" algn="ctr">
-            <a:solidFill>
-              <a:schemeClr val="accent6">
-                <a:lumMod val="75000"/>
-              </a:schemeClr>
-            </a:solidFill>
-            <a:prstDash val="lgDashDot"/>
-            <a:miter lim="800000"/>
-            <a:headEnd type="triangle" w="med" len="med"/>
-            <a:tailEnd type="none" w="med" len="med"/>
-          </a:ln>
-          <a:effectLst/>
-        </p:spPr>
-      </p:cxnSp>
-      <p:sp>
-        <p:nvSpPr>
-          <p:cNvPr id="63" name="ZoneTexte 62">
-            <a:extLst>
-              <a:ext uri="{FF2B5EF4-FFF2-40B4-BE49-F238E27FC236}">
-                <a16:creationId xmlns:a16="http://schemas.microsoft.com/office/drawing/2014/main" id="{A3B13F76-7ED5-4D2E-83C9-7A5FE3CF6B6B}"/>
-              </a:ext>
-            </a:extLst>
-          </p:cNvPr>
-          <p:cNvSpPr txBox="1"/>
-          <p:nvPr/>
-        </p:nvSpPr>
-        <p:spPr>
-          <a:xfrm>
-            <a:off x="7334345" y="3559877"/>
-            <a:ext cx="2437277" cy="369332"/>
-          </a:xfrm>
-          <a:prstGeom prst="rect">
-            <a:avLst/>
-          </a:prstGeom>
-          <a:noFill/>
-        </p:spPr>
-        <p:txBody>
-          <a:bodyPr wrap="square" rtlCol="0">
-            <a:spAutoFit/>
-          </a:bodyPr>
-          <a:lstStyle/>
-          <a:p>
-            <a:pPr algn="ctr"/>
-            <a:r>
-              <a:rPr lang="fr-FR" kern="0" dirty="0">
-                <a:solidFill>
-                  <a:schemeClr val="accent6">
-                    <a:lumMod val="75000"/>
-                  </a:schemeClr>
-                </a:solidFill>
-                <a:latin typeface="Times New Roman" panose="02020603050405020304" pitchFamily="18" charset="0"/>
-                <a:cs typeface="Times New Roman" panose="02020603050405020304" pitchFamily="18" charset="0"/>
-              </a:rPr>
-              <a:t>Out? 0 @ </a:t>
-            </a:r>
-            <a:r>
-              <a:rPr lang="fr-FR" u="sng" kern="0" dirty="0">
-                <a:solidFill>
-                  <a:schemeClr val="accent6">
-                    <a:lumMod val="75000"/>
-                  </a:schemeClr>
-                </a:solidFill>
-                <a:latin typeface="Times New Roman" panose="02020603050405020304" pitchFamily="18" charset="0"/>
-                <a:cs typeface="Times New Roman" panose="02020603050405020304" pitchFamily="18" charset="0"/>
-              </a:rPr>
-              <a:t>41</a:t>
-            </a:r>
-            <a:r>
-              <a:rPr lang="fr-FR" kern="0" dirty="0">
-                <a:solidFill>
-                  <a:schemeClr val="accent6">
-                    <a:lumMod val="75000"/>
-                  </a:schemeClr>
-                </a:solidFill>
-                <a:latin typeface="Times New Roman" panose="02020603050405020304" pitchFamily="18" charset="0"/>
-                <a:cs typeface="Times New Roman" panose="02020603050405020304" pitchFamily="18" charset="0"/>
-              </a:rPr>
-              <a:t> time</a:t>
-            </a:r>
-            <a:endParaRPr lang="fr-FR" sz="2000" kern="0" dirty="0">
-              <a:solidFill>
-                <a:schemeClr val="accent6">
-                  <a:lumMod val="75000"/>
-                </a:schemeClr>
-              </a:solidFill>
-              <a:latin typeface="Times New Roman" panose="02020603050405020304" pitchFamily="18" charset="0"/>
-              <a:cs typeface="Times New Roman" panose="02020603050405020304" pitchFamily="18" charset="0"/>
-            </a:endParaRPr>
-          </a:p>
-        </p:txBody>
-      </p:sp>
-      <p:cxnSp>
-        <p:nvCxnSpPr>
-          <p:cNvPr id="64" name="Connecteur droit avec flèche 63">
-            <a:extLst>
-              <a:ext uri="{FF2B5EF4-FFF2-40B4-BE49-F238E27FC236}">
-                <a16:creationId xmlns:a16="http://schemas.microsoft.com/office/drawing/2014/main" id="{09EBEFA5-173B-40C4-ABCF-DEA3DE2BE4DE}"/>
-              </a:ext>
-            </a:extLst>
-          </p:cNvPr>
-          <p:cNvCxnSpPr/>
-          <p:nvPr/>
-        </p:nvCxnSpPr>
-        <p:spPr>
-          <a:xfrm>
-            <a:off x="7403920" y="4995310"/>
-            <a:ext cx="2306677" cy="4764"/>
-          </a:xfrm>
-          <a:prstGeom prst="straightConnector1">
-            <a:avLst/>
-          </a:prstGeom>
-          <a:noFill/>
-          <a:ln w="6350" cap="flat" cmpd="sng" algn="ctr">
-            <a:solidFill>
-              <a:srgbClr val="FF0000"/>
-            </a:solidFill>
-            <a:prstDash val="lgDashDot"/>
-            <a:miter lim="800000"/>
-            <a:headEnd type="triangle" w="med" len="med"/>
-            <a:tailEnd type="none" w="med" len="med"/>
-          </a:ln>
-          <a:effectLst/>
-        </p:spPr>
-      </p:cxnSp>
-      <p:sp>
-        <p:nvSpPr>
-          <p:cNvPr id="65" name="ZoneTexte 64">
-            <a:extLst>
-              <a:ext uri="{FF2B5EF4-FFF2-40B4-BE49-F238E27FC236}">
-                <a16:creationId xmlns:a16="http://schemas.microsoft.com/office/drawing/2014/main" id="{4214A42A-BCF9-4932-9250-CBCDAFD34D8E}"/>
-              </a:ext>
-            </a:extLst>
-          </p:cNvPr>
-          <p:cNvSpPr txBox="1"/>
-          <p:nvPr/>
-        </p:nvSpPr>
-        <p:spPr>
-          <a:xfrm>
-            <a:off x="7346181" y="4602353"/>
-            <a:ext cx="2437277" cy="369332"/>
-          </a:xfrm>
-          <a:prstGeom prst="rect">
-            <a:avLst/>
-          </a:prstGeom>
-          <a:noFill/>
-        </p:spPr>
-        <p:txBody>
-          <a:bodyPr wrap="square" rtlCol="0">
-            <a:spAutoFit/>
-          </a:bodyPr>
-          <a:lstStyle/>
-          <a:p>
-            <a:pPr algn="ctr"/>
-            <a:r>
-              <a:rPr lang="fr-FR" kern="0" dirty="0">
-                <a:solidFill>
-                  <a:srgbClr val="FF0000"/>
-                </a:solidFill>
-                <a:latin typeface="Times New Roman" panose="02020603050405020304" pitchFamily="18" charset="0"/>
-                <a:cs typeface="Times New Roman" panose="02020603050405020304" pitchFamily="18" charset="0"/>
-              </a:rPr>
-              <a:t>Quiescence @ </a:t>
-            </a:r>
-            <a:r>
-              <a:rPr lang="fr-FR" u="sng" kern="0" dirty="0">
-                <a:solidFill>
-                  <a:srgbClr val="FF0000"/>
-                </a:solidFill>
-                <a:latin typeface="Times New Roman" panose="02020603050405020304" pitchFamily="18" charset="0"/>
-                <a:cs typeface="Times New Roman" panose="02020603050405020304" pitchFamily="18" charset="0"/>
-              </a:rPr>
-              <a:t>60</a:t>
-            </a:r>
-            <a:r>
-              <a:rPr lang="fr-FR" kern="0" dirty="0">
-                <a:solidFill>
-                  <a:srgbClr val="FF0000"/>
-                </a:solidFill>
-                <a:latin typeface="Times New Roman" panose="02020603050405020304" pitchFamily="18" charset="0"/>
-                <a:cs typeface="Times New Roman" panose="02020603050405020304" pitchFamily="18" charset="0"/>
-              </a:rPr>
-              <a:t> time</a:t>
-            </a:r>
-            <a:endParaRPr lang="fr-FR" sz="2000" kern="0" dirty="0">
-              <a:solidFill>
-                <a:srgbClr val="FF0000"/>
-              </a:solidFill>
-              <a:latin typeface="Times New Roman" panose="02020603050405020304" pitchFamily="18" charset="0"/>
-              <a:cs typeface="Times New Roman" panose="02020603050405020304" pitchFamily="18" charset="0"/>
-            </a:endParaRPr>
-          </a:p>
-        </p:txBody>
-      </p:sp>
-      <p:sp>
-        <p:nvSpPr>
-          <p:cNvPr id="75" name="Rectangle 74">
-            <a:extLst>
-              <a:ext uri="{FF2B5EF4-FFF2-40B4-BE49-F238E27FC236}">
-                <a16:creationId xmlns:a16="http://schemas.microsoft.com/office/drawing/2014/main" id="{2FA1ED3C-81F7-45BC-A7E3-105BFF6653E0}"/>
-              </a:ext>
-            </a:extLst>
-          </p:cNvPr>
-          <p:cNvSpPr/>
-          <p:nvPr/>
-        </p:nvSpPr>
-        <p:spPr>
-          <a:xfrm>
-            <a:off x="2733133" y="3955464"/>
-            <a:ext cx="615759" cy="307777"/>
-          </a:xfrm>
-          <a:prstGeom prst="rect">
-            <a:avLst/>
-          </a:prstGeom>
-        </p:spPr>
-        <p:txBody>
-          <a:bodyPr wrap="square">
-            <a:spAutoFit/>
-          </a:bodyPr>
-          <a:lstStyle/>
-          <a:p>
-            <a:pPr lvl="0" algn="ctr"/>
-            <a:r>
-              <a:rPr lang="fr-FR" sz="1400" b="1" dirty="0">
-                <a:solidFill>
-                  <a:schemeClr val="accent6">
-                    <a:lumMod val="75000"/>
-                  </a:schemeClr>
-                </a:solidFill>
-                <a:latin typeface="Times New Roman" panose="02020603050405020304" pitchFamily="18" charset="0"/>
-                <a:cs typeface="Times New Roman" panose="02020603050405020304" pitchFamily="18" charset="0"/>
-              </a:rPr>
-              <a:t>PASS</a:t>
-            </a:r>
-            <a:endParaRPr lang="en-US" sz="1400" b="1" dirty="0">
-              <a:solidFill>
-                <a:schemeClr val="accent6">
-                  <a:lumMod val="75000"/>
-                </a:schemeClr>
-              </a:solidFill>
-            </a:endParaRPr>
-          </a:p>
-        </p:txBody>
-      </p:sp>
-      <p:cxnSp>
-        <p:nvCxnSpPr>
-          <p:cNvPr id="77" name="Connecteur droit avec flèche 76">
-            <a:extLst>
-              <a:ext uri="{FF2B5EF4-FFF2-40B4-BE49-F238E27FC236}">
-                <a16:creationId xmlns:a16="http://schemas.microsoft.com/office/drawing/2014/main" id="{11BD21A4-FD34-4458-BBC4-1E0C2789CBDE}"/>
-              </a:ext>
-            </a:extLst>
-          </p:cNvPr>
-          <p:cNvCxnSpPr>
-            <a:cxnSpLocks/>
-            <a:stCxn id="78" idx="6"/>
-            <a:endCxn id="80" idx="2"/>
-          </p:cNvCxnSpPr>
-          <p:nvPr/>
-        </p:nvCxnSpPr>
-        <p:spPr>
-          <a:xfrm>
-            <a:off x="-1144319" y="4091135"/>
-            <a:ext cx="1907215" cy="0"/>
-          </a:xfrm>
-          <a:prstGeom prst="straightConnector1">
-            <a:avLst/>
-          </a:prstGeom>
-          <a:ln w="38100">
-            <a:solidFill>
-              <a:schemeClr val="tx1"/>
-            </a:solidFill>
-            <a:prstDash val="sysDash"/>
-            <a:headEnd type="none" w="med" len="med"/>
-            <a:tailEnd type="arrow" w="med" len="med"/>
-          </a:ln>
-          <a:extLst>
-            <a:ext uri="{909E8E84-426E-40DD-AFC4-6F175D3DCCD1}">
-              <a14:hiddenFill xmlns:a14="http://schemas.microsoft.com/office/drawing/2010/main">
-                <a:noFill/>
-              </a14:hiddenFill>
-            </a:ext>
-          </a:extLst>
-        </p:spPr>
-        <p:style>
-          <a:lnRef idx="1">
-            <a:schemeClr val="accent1"/>
-          </a:lnRef>
-          <a:fillRef idx="0">
-            <a:schemeClr val="accent1"/>
-          </a:fillRef>
-          <a:effectRef idx="0">
-            <a:schemeClr val="accent1"/>
-          </a:effectRef>
-          <a:fontRef idx="minor">
-            <a:schemeClr val="tx1"/>
-          </a:fontRef>
-        </p:style>
-      </p:cxnSp>
-      <p:sp>
-        <p:nvSpPr>
-          <p:cNvPr id="78" name="Ellipse 77">
-            <a:extLst>
-              <a:ext uri="{FF2B5EF4-FFF2-40B4-BE49-F238E27FC236}">
-                <a16:creationId xmlns:a16="http://schemas.microsoft.com/office/drawing/2014/main" id="{A5CFA824-9A6A-457A-A1AE-A2B557550D73}"/>
-              </a:ext>
-            </a:extLst>
-          </p:cNvPr>
-          <p:cNvSpPr/>
-          <p:nvPr/>
-        </p:nvSpPr>
-        <p:spPr bwMode="auto">
-          <a:xfrm>
-            <a:off x="-1622196" y="3842791"/>
-            <a:ext cx="477877" cy="496687"/>
-          </a:xfrm>
-          <a:prstGeom prst="ellipse">
-            <a:avLst/>
-          </a:prstGeom>
-          <a:noFill/>
-          <a:ln w="38100">
-            <a:solidFill>
-              <a:schemeClr val="tx1"/>
-            </a:solidFill>
-          </a:ln>
-        </p:spPr>
-        <p:style>
-          <a:lnRef idx="2">
-            <a:schemeClr val="accent1">
-              <a:shade val="50000"/>
-            </a:schemeClr>
-          </a:lnRef>
-          <a:fillRef idx="1">
-            <a:schemeClr val="accent1"/>
-          </a:fillRef>
-          <a:effectRef idx="0">
-            <a:schemeClr val="accent1"/>
-          </a:effectRef>
-          <a:fontRef idx="minor">
-            <a:schemeClr val="lt1"/>
-          </a:fontRef>
-        </p:style>
-        <p:txBody>
-          <a:bodyPr rtlCol="0" anchor="ctr"/>
-          <a:lstStyle/>
-          <a:p>
-            <a:pPr algn="ctr"/>
-            <a:endParaRPr lang="fr-FR" sz="1200" baseline="-25000" dirty="0">
-              <a:solidFill>
-                <a:schemeClr val="tx1"/>
-              </a:solidFill>
-              <a:latin typeface="Times New Roman" panose="02020603050405020304" pitchFamily="18" charset="0"/>
-              <a:cs typeface="Times New Roman" panose="02020603050405020304" pitchFamily="18" charset="0"/>
-            </a:endParaRPr>
-          </a:p>
-        </p:txBody>
-      </p:sp>
-      <p:sp>
-        <p:nvSpPr>
-          <p:cNvPr id="80" name="Ellipse 79">
-            <a:extLst>
-              <a:ext uri="{FF2B5EF4-FFF2-40B4-BE49-F238E27FC236}">
-                <a16:creationId xmlns:a16="http://schemas.microsoft.com/office/drawing/2014/main" id="{B5E68626-2A49-4669-BC3B-841CBD620AC2}"/>
-              </a:ext>
-            </a:extLst>
-          </p:cNvPr>
-          <p:cNvSpPr/>
-          <p:nvPr/>
-        </p:nvSpPr>
-        <p:spPr bwMode="auto">
-          <a:xfrm>
-            <a:off x="762896" y="3842791"/>
-            <a:ext cx="477877" cy="496687"/>
-          </a:xfrm>
-          <a:prstGeom prst="ellipse">
-            <a:avLst/>
-          </a:prstGeom>
-          <a:noFill/>
-          <a:ln w="38100">
-            <a:solidFill>
-              <a:schemeClr val="tx1"/>
-            </a:solidFill>
-          </a:ln>
-        </p:spPr>
-        <p:style>
-          <a:lnRef idx="2">
-            <a:schemeClr val="accent1">
-              <a:shade val="50000"/>
-            </a:schemeClr>
-          </a:lnRef>
-          <a:fillRef idx="1">
-            <a:schemeClr val="accent1"/>
-          </a:fillRef>
-          <a:effectRef idx="0">
-            <a:schemeClr val="accent1"/>
-          </a:effectRef>
-          <a:fontRef idx="minor">
-            <a:schemeClr val="lt1"/>
-          </a:fontRef>
-        </p:style>
-        <p:txBody>
-          <a:bodyPr rtlCol="0" anchor="ctr"/>
-          <a:lstStyle/>
-          <a:p>
-            <a:pPr algn="ctr"/>
-            <a:endParaRPr lang="fr-FR" sz="1200" baseline="-25000" dirty="0">
-              <a:solidFill>
-                <a:schemeClr val="tx1"/>
-              </a:solidFill>
-              <a:latin typeface="Times New Roman" panose="02020603050405020304" pitchFamily="18" charset="0"/>
-              <a:cs typeface="Times New Roman" panose="02020603050405020304" pitchFamily="18" charset="0"/>
-            </a:endParaRPr>
-          </a:p>
-        </p:txBody>
-      </p:sp>
-      <p:cxnSp>
-        <p:nvCxnSpPr>
-          <p:cNvPr id="82" name="Connecteur droit avec flèche 81">
-            <a:extLst>
-              <a:ext uri="{FF2B5EF4-FFF2-40B4-BE49-F238E27FC236}">
-                <a16:creationId xmlns:a16="http://schemas.microsoft.com/office/drawing/2014/main" id="{E28A17DE-1359-4DBB-8F6F-98C11F48041A}"/>
-              </a:ext>
-            </a:extLst>
-          </p:cNvPr>
-          <p:cNvCxnSpPr>
-            <a:cxnSpLocks/>
-            <a:stCxn id="78" idx="4"/>
-          </p:cNvCxnSpPr>
-          <p:nvPr/>
-        </p:nvCxnSpPr>
-        <p:spPr>
-          <a:xfrm flipH="1">
-            <a:off x="-1383258" y="4339478"/>
-            <a:ext cx="1" cy="441506"/>
-          </a:xfrm>
-          <a:prstGeom prst="straightConnector1">
-            <a:avLst/>
-          </a:prstGeom>
-          <a:ln w="38100">
-            <a:solidFill>
-              <a:srgbClr val="FF0000"/>
-            </a:solidFill>
-            <a:prstDash val="sysDash"/>
-            <a:headEnd type="none" w="med" len="med"/>
-            <a:tailEnd type="arrow" w="med" len="med"/>
-          </a:ln>
-          <a:extLst>
-            <a:ext uri="{909E8E84-426E-40DD-AFC4-6F175D3DCCD1}">
-              <a14:hiddenFill xmlns:a14="http://schemas.microsoft.com/office/drawing/2010/main">
-                <a:noFill/>
-              </a14:hiddenFill>
-            </a:ext>
-          </a:extLst>
-        </p:spPr>
-        <p:style>
-          <a:lnRef idx="1">
-            <a:schemeClr val="accent1"/>
-          </a:lnRef>
-          <a:fillRef idx="0">
-            <a:schemeClr val="accent1"/>
-          </a:fillRef>
-          <a:effectRef idx="0">
-            <a:schemeClr val="accent1"/>
-          </a:effectRef>
-          <a:fontRef idx="minor">
-            <a:schemeClr val="tx1"/>
-          </a:fontRef>
-        </p:style>
-      </p:cxnSp>
-      <p:cxnSp>
-        <p:nvCxnSpPr>
-          <p:cNvPr id="83" name="Connecteur droit avec flèche 82">
-            <a:extLst>
-              <a:ext uri="{FF2B5EF4-FFF2-40B4-BE49-F238E27FC236}">
-                <a16:creationId xmlns:a16="http://schemas.microsoft.com/office/drawing/2014/main" id="{E0380D46-A424-441E-BC25-C1EC26863D25}"/>
-              </a:ext>
-            </a:extLst>
-          </p:cNvPr>
-          <p:cNvCxnSpPr>
-            <a:cxnSpLocks/>
-            <a:stCxn id="78" idx="0"/>
-          </p:cNvCxnSpPr>
-          <p:nvPr/>
-        </p:nvCxnSpPr>
-        <p:spPr>
-          <a:xfrm flipV="1">
-            <a:off x="-1383257" y="3502185"/>
-            <a:ext cx="396622" cy="340606"/>
-          </a:xfrm>
-          <a:prstGeom prst="straightConnector1">
-            <a:avLst/>
-          </a:prstGeom>
-          <a:ln w="38100">
-            <a:solidFill>
-              <a:srgbClr val="FFC000"/>
-            </a:solidFill>
-            <a:prstDash val="sysDash"/>
-            <a:headEnd type="none" w="med" len="med"/>
-            <a:tailEnd type="arrow" w="med" len="med"/>
-          </a:ln>
-          <a:extLst>
-            <a:ext uri="{909E8E84-426E-40DD-AFC4-6F175D3DCCD1}">
-              <a14:hiddenFill xmlns:a14="http://schemas.microsoft.com/office/drawing/2010/main">
-                <a:noFill/>
-              </a14:hiddenFill>
-            </a:ext>
-          </a:extLst>
-        </p:spPr>
-        <p:style>
-          <a:lnRef idx="1">
-            <a:schemeClr val="accent1"/>
-          </a:lnRef>
-          <a:fillRef idx="0">
-            <a:schemeClr val="accent1"/>
-          </a:fillRef>
-          <a:effectRef idx="0">
-            <a:schemeClr val="accent1"/>
-          </a:effectRef>
-          <a:fontRef idx="minor">
-            <a:schemeClr val="tx1"/>
-          </a:fontRef>
-        </p:style>
-      </p:cxnSp>
-      <p:cxnSp>
-        <p:nvCxnSpPr>
-          <p:cNvPr id="84" name="Connecteur droit avec flèche 83">
-            <a:extLst>
-              <a:ext uri="{FF2B5EF4-FFF2-40B4-BE49-F238E27FC236}">
-                <a16:creationId xmlns:a16="http://schemas.microsoft.com/office/drawing/2014/main" id="{72F7D59F-15B1-47F6-A00C-6649006E9A1D}"/>
-              </a:ext>
-            </a:extLst>
-          </p:cNvPr>
-          <p:cNvCxnSpPr>
-            <a:cxnSpLocks/>
-            <a:stCxn id="80" idx="5"/>
-            <a:endCxn id="87" idx="1"/>
-          </p:cNvCxnSpPr>
-          <p:nvPr/>
-        </p:nvCxnSpPr>
-        <p:spPr>
-          <a:xfrm>
-            <a:off x="1170790" y="4266740"/>
-            <a:ext cx="1062944" cy="1390658"/>
-          </a:xfrm>
-          <a:prstGeom prst="straightConnector1">
-            <a:avLst/>
-          </a:prstGeom>
-          <a:ln w="38100">
-            <a:solidFill>
-              <a:srgbClr val="FF0000"/>
-            </a:solidFill>
-            <a:prstDash val="solid"/>
-            <a:headEnd type="none" w="med" len="med"/>
-            <a:tailEnd type="arrow" w="med" len="med"/>
-          </a:ln>
-          <a:extLst>
-            <a:ext uri="{909E8E84-426E-40DD-AFC4-6F175D3DCCD1}">
-              <a14:hiddenFill xmlns:a14="http://schemas.microsoft.com/office/drawing/2010/main">
-                <a:noFill/>
-              </a14:hiddenFill>
-            </a:ext>
-          </a:extLst>
-        </p:spPr>
-        <p:style>
-          <a:lnRef idx="1">
-            <a:schemeClr val="accent1"/>
-          </a:lnRef>
-          <a:fillRef idx="0">
-            <a:schemeClr val="accent1"/>
-          </a:fillRef>
-          <a:effectRef idx="0">
-            <a:schemeClr val="accent1"/>
-          </a:effectRef>
-          <a:fontRef idx="minor">
-            <a:schemeClr val="tx1"/>
-          </a:fontRef>
-        </p:style>
-      </p:cxnSp>
-      <p:cxnSp>
-        <p:nvCxnSpPr>
-          <p:cNvPr id="86" name="Connecteur droit avec flèche 85">
-            <a:extLst>
-              <a:ext uri="{FF2B5EF4-FFF2-40B4-BE49-F238E27FC236}">
-                <a16:creationId xmlns:a16="http://schemas.microsoft.com/office/drawing/2014/main" id="{D5EC626E-B61C-4373-9A18-CB9BB4FC891F}"/>
-              </a:ext>
-            </a:extLst>
-          </p:cNvPr>
-          <p:cNvCxnSpPr>
-            <a:cxnSpLocks/>
-            <a:stCxn id="80" idx="6"/>
-            <a:endCxn id="75" idx="1"/>
-          </p:cNvCxnSpPr>
-          <p:nvPr/>
-        </p:nvCxnSpPr>
-        <p:spPr>
-          <a:xfrm>
-            <a:off x="1240773" y="4091135"/>
-            <a:ext cx="1492360" cy="18218"/>
-          </a:xfrm>
-          <a:prstGeom prst="straightConnector1">
-            <a:avLst/>
-          </a:prstGeom>
-          <a:ln w="38100">
-            <a:solidFill>
-              <a:schemeClr val="tx1"/>
-            </a:solidFill>
-            <a:prstDash val="solid"/>
-            <a:headEnd type="none" w="med" len="med"/>
-            <a:tailEnd type="arrow" w="med" len="med"/>
-          </a:ln>
-          <a:extLst>
-            <a:ext uri="{909E8E84-426E-40DD-AFC4-6F175D3DCCD1}">
-              <a14:hiddenFill xmlns:a14="http://schemas.microsoft.com/office/drawing/2010/main">
-                <a:noFill/>
-              </a14:hiddenFill>
-            </a:ext>
-          </a:extLst>
-        </p:spPr>
-        <p:style>
-          <a:lnRef idx="1">
-            <a:schemeClr val="accent1"/>
-          </a:lnRef>
-          <a:fillRef idx="0">
-            <a:schemeClr val="accent1"/>
-          </a:fillRef>
-          <a:effectRef idx="0">
-            <a:schemeClr val="accent1"/>
-          </a:effectRef>
-          <a:fontRef idx="minor">
-            <a:schemeClr val="tx1"/>
-          </a:fontRef>
-        </p:style>
-      </p:cxnSp>
-      <p:sp>
-        <p:nvSpPr>
-          <p:cNvPr id="87" name="Rectangle 86">
-            <a:extLst>
-              <a:ext uri="{FF2B5EF4-FFF2-40B4-BE49-F238E27FC236}">
-                <a16:creationId xmlns:a16="http://schemas.microsoft.com/office/drawing/2014/main" id="{04073DF1-9503-4080-8D80-F8C979FBE757}"/>
-              </a:ext>
-            </a:extLst>
-          </p:cNvPr>
-          <p:cNvSpPr/>
-          <p:nvPr/>
-        </p:nvSpPr>
-        <p:spPr>
-          <a:xfrm>
-            <a:off x="2233734" y="5503509"/>
-            <a:ext cx="889475" cy="307777"/>
-          </a:xfrm>
-          <a:prstGeom prst="rect">
-            <a:avLst/>
-          </a:prstGeom>
-          <a:ln>
-            <a:noFill/>
-          </a:ln>
-        </p:spPr>
-        <p:txBody>
-          <a:bodyPr wrap="none">
-            <a:spAutoFit/>
-          </a:bodyPr>
-          <a:lstStyle/>
-          <a:p>
-            <a:pPr lvl="0" algn="ctr"/>
-            <a:r>
-              <a:rPr lang="fr-FR" sz="1400" dirty="0">
-                <a:solidFill>
-                  <a:srgbClr val="FF0000"/>
-                </a:solidFill>
-              </a:rPr>
-              <a:t> </a:t>
-            </a:r>
-            <a:r>
-              <a:rPr lang="fr-FR" sz="1400" b="1" dirty="0" err="1">
-                <a:solidFill>
-                  <a:srgbClr val="FF0000"/>
-                </a:solidFill>
-                <a:latin typeface="Times New Roman" panose="02020603050405020304" pitchFamily="18" charset="0"/>
-                <a:cs typeface="Times New Roman" panose="02020603050405020304" pitchFamily="18" charset="0"/>
-              </a:rPr>
-              <a:t>FAILout</a:t>
-            </a:r>
-            <a:endParaRPr lang="en-US" sz="1400" baseline="30000" dirty="0">
-              <a:solidFill>
-                <a:srgbClr val="FF0000"/>
-              </a:solidFill>
-            </a:endParaRPr>
-          </a:p>
-        </p:txBody>
-      </p:sp>
-      <p:sp>
-        <p:nvSpPr>
-          <p:cNvPr id="90" name="ZoneTexte 89">
-            <a:extLst>
-              <a:ext uri="{FF2B5EF4-FFF2-40B4-BE49-F238E27FC236}">
-                <a16:creationId xmlns:a16="http://schemas.microsoft.com/office/drawing/2014/main" id="{E3E9F91B-9A30-4C26-A162-0840D94F236A}"/>
-              </a:ext>
-            </a:extLst>
-          </p:cNvPr>
-          <p:cNvSpPr txBox="1"/>
-          <p:nvPr/>
-        </p:nvSpPr>
-        <p:spPr>
-          <a:xfrm>
-            <a:off x="-973504" y="2607892"/>
-            <a:ext cx="2448239" cy="1384995"/>
-          </a:xfrm>
-          <a:prstGeom prst="rect">
-            <a:avLst/>
-          </a:prstGeom>
-          <a:noFill/>
-        </p:spPr>
-        <p:txBody>
-          <a:bodyPr wrap="square">
-            <a:spAutoFit/>
-          </a:bodyPr>
-          <a:lstStyle/>
-          <a:p>
-            <a:pPr marL="0" marR="0">
-              <a:spcBef>
-                <a:spcPts val="0"/>
-              </a:spcBef>
-              <a:spcAft>
-                <a:spcPts val="0"/>
-              </a:spcAft>
-            </a:pPr>
-            <a:r>
-              <a:rPr lang="en-US" sz="1200" b="1" dirty="0" err="1">
-                <a:effectLst/>
-                <a:latin typeface="Times New Roman" panose="02020603050405020304" pitchFamily="18" charset="0"/>
-                <a:cs typeface="Times New Roman" panose="02020603050405020304" pitchFamily="18" charset="0"/>
-              </a:rPr>
-              <a:t>tguard</a:t>
-            </a:r>
-            <a:r>
-              <a:rPr lang="en-US" sz="1200" dirty="0">
-                <a:effectLst/>
-                <a:latin typeface="Times New Roman" panose="02020603050405020304" pitchFamily="18" charset="0"/>
-                <a:cs typeface="Times New Roman" panose="02020603050405020304" pitchFamily="18" charset="0"/>
-              </a:rPr>
-              <a:t> (cl &lt; TM);</a:t>
-            </a:r>
-          </a:p>
-          <a:p>
-            <a:pPr marL="0" marR="0">
-              <a:spcBef>
-                <a:spcPts val="0"/>
-              </a:spcBef>
-              <a:spcAft>
-                <a:spcPts val="0"/>
-              </a:spcAft>
-            </a:pPr>
-            <a:r>
-              <a:rPr lang="en-US" sz="1200" b="1" dirty="0">
-                <a:effectLst/>
-                <a:latin typeface="Times New Roman" panose="02020603050405020304" pitchFamily="18" charset="0"/>
-                <a:cs typeface="Times New Roman" panose="02020603050405020304" pitchFamily="18" charset="0"/>
-              </a:rPr>
-              <a:t>guard</a:t>
-            </a:r>
-            <a:r>
-              <a:rPr lang="en-US" sz="1200" dirty="0">
-                <a:effectLst/>
-                <a:latin typeface="Times New Roman" panose="02020603050405020304" pitchFamily="18" charset="0"/>
-                <a:cs typeface="Times New Roman" panose="02020603050405020304" pitchFamily="18" charset="0"/>
-              </a:rPr>
-              <a:t> (</a:t>
-            </a:r>
-            <a:r>
-              <a:rPr lang="en-US" sz="1200" b="1" dirty="0">
-                <a:effectLst/>
-                <a:latin typeface="Times New Roman" panose="02020603050405020304" pitchFamily="18" charset="0"/>
-                <a:cs typeface="Times New Roman" panose="02020603050405020304" pitchFamily="18" charset="0"/>
-              </a:rPr>
-              <a:t>exists</a:t>
-            </a:r>
-            <a:r>
-              <a:rPr lang="en-US" sz="1200" dirty="0">
-                <a:effectLst/>
-                <a:latin typeface="Times New Roman" panose="02020603050405020304" pitchFamily="18" charset="0"/>
-                <a:cs typeface="Times New Roman" panose="02020603050405020304" pitchFamily="18" charset="0"/>
-              </a:rPr>
-              <a:t>&lt; #2 : </a:t>
-            </a:r>
-            <a:r>
-              <a:rPr lang="en-US" sz="1200" b="1" dirty="0" err="1">
-                <a:effectLst/>
-                <a:latin typeface="Times New Roman" panose="02020603050405020304" pitchFamily="18" charset="0"/>
-                <a:cs typeface="Times New Roman" panose="02020603050405020304" pitchFamily="18" charset="0"/>
-              </a:rPr>
-              <a:t>urational</a:t>
-            </a:r>
-            <a:r>
-              <a:rPr lang="en-US" sz="1200" dirty="0">
-                <a:effectLst/>
-                <a:latin typeface="Times New Roman" panose="02020603050405020304" pitchFamily="18" charset="0"/>
-                <a:cs typeface="Times New Roman" panose="02020603050405020304" pitchFamily="18" charset="0"/>
-              </a:rPr>
-              <a:t> , $1 : </a:t>
-            </a:r>
-            <a:r>
-              <a:rPr lang="en-US" sz="1200" b="1" dirty="0" err="1">
-                <a:effectLst/>
-                <a:latin typeface="Times New Roman" panose="02020603050405020304" pitchFamily="18" charset="0"/>
-                <a:cs typeface="Times New Roman" panose="02020603050405020304" pitchFamily="18" charset="0"/>
-              </a:rPr>
-              <a:t>urational</a:t>
-            </a:r>
-            <a:r>
-              <a:rPr lang="en-US" sz="1200" dirty="0">
-                <a:effectLst/>
-                <a:latin typeface="Times New Roman" panose="02020603050405020304" pitchFamily="18" charset="0"/>
-                <a:cs typeface="Times New Roman" panose="02020603050405020304" pitchFamily="18" charset="0"/>
-              </a:rPr>
-              <a:t> &gt;(((#2 + x1) == 42) &amp;&amp; ($1 == 0)) &amp;&amp; (0 &lt;= (x1 + -1)) &amp;&amp; (x1 &lt;= 5) &amp;&amp; (x1 &lt;= 10));</a:t>
-            </a:r>
-          </a:p>
-          <a:p>
-            <a:pPr marL="0" marR="0">
-              <a:spcBef>
-                <a:spcPts val="0"/>
-              </a:spcBef>
-              <a:spcAft>
-                <a:spcPts val="0"/>
-              </a:spcAft>
-            </a:pPr>
-            <a:r>
-              <a:rPr lang="en-US" sz="1200" b="1" dirty="0">
-                <a:effectLst/>
-                <a:latin typeface="Times New Roman" panose="02020603050405020304" pitchFamily="18" charset="0"/>
-                <a:cs typeface="Times New Roman" panose="02020603050405020304" pitchFamily="18" charset="0"/>
-              </a:rPr>
-              <a:t>output</a:t>
-            </a:r>
-            <a:r>
-              <a:rPr lang="en-US" sz="1200" dirty="0">
-                <a:effectLst/>
-                <a:latin typeface="Times New Roman" panose="02020603050405020304" pitchFamily="18" charset="0"/>
-                <a:cs typeface="Times New Roman" panose="02020603050405020304" pitchFamily="18" charset="0"/>
-              </a:rPr>
-              <a:t> In(x1);</a:t>
-            </a:r>
-          </a:p>
-          <a:p>
-            <a:pPr marL="0" marR="0">
-              <a:spcBef>
-                <a:spcPts val="0"/>
-              </a:spcBef>
-              <a:spcAft>
-                <a:spcPts val="0"/>
-              </a:spcAft>
-            </a:pPr>
-            <a:r>
-              <a:rPr lang="en-US" sz="1200" dirty="0">
-                <a:effectLst/>
-                <a:latin typeface="Times New Roman" panose="02020603050405020304" pitchFamily="18" charset="0"/>
-                <a:cs typeface="Times New Roman" panose="02020603050405020304" pitchFamily="18" charset="0"/>
-              </a:rPr>
-              <a:t>cl := 0;</a:t>
-            </a:r>
-          </a:p>
-        </p:txBody>
-      </p:sp>
-      <p:sp>
-        <p:nvSpPr>
-          <p:cNvPr id="92" name="ZoneTexte 91">
-            <a:extLst>
-              <a:ext uri="{FF2B5EF4-FFF2-40B4-BE49-F238E27FC236}">
-                <a16:creationId xmlns:a16="http://schemas.microsoft.com/office/drawing/2014/main" id="{F3A93B70-23F6-4CDC-BE1D-B7FA89CC89CD}"/>
-              </a:ext>
-            </a:extLst>
-          </p:cNvPr>
-          <p:cNvSpPr txBox="1"/>
-          <p:nvPr/>
-        </p:nvSpPr>
-        <p:spPr>
-          <a:xfrm>
-            <a:off x="1464042" y="3189986"/>
-            <a:ext cx="3582465" cy="830997"/>
-          </a:xfrm>
-          <a:prstGeom prst="rect">
-            <a:avLst/>
-          </a:prstGeom>
-          <a:noFill/>
-        </p:spPr>
-        <p:txBody>
-          <a:bodyPr wrap="square">
-            <a:spAutoFit/>
-          </a:bodyPr>
-          <a:lstStyle/>
-          <a:p>
-            <a:pPr marL="0" marR="0">
-              <a:spcBef>
-                <a:spcPts val="0"/>
-              </a:spcBef>
-              <a:spcAft>
-                <a:spcPts val="0"/>
-              </a:spcAft>
-            </a:pPr>
-            <a:r>
-              <a:rPr lang="en-US" sz="1200" b="1" dirty="0" err="1">
-                <a:effectLst/>
-                <a:latin typeface="Times New Roman" panose="02020603050405020304" pitchFamily="18" charset="0"/>
-                <a:cs typeface="Times New Roman" panose="02020603050405020304" pitchFamily="18" charset="0"/>
-              </a:rPr>
-              <a:t>tguard</a:t>
-            </a:r>
-            <a:r>
-              <a:rPr lang="en-US" sz="1200" dirty="0">
-                <a:effectLst/>
-                <a:latin typeface="Times New Roman" panose="02020603050405020304" pitchFamily="18" charset="0"/>
-                <a:cs typeface="Times New Roman" panose="02020603050405020304" pitchFamily="18" charset="0"/>
-              </a:rPr>
-              <a:t> ((#2 </a:t>
-            </a:r>
-            <a:r>
-              <a:rPr lang="en-US" sz="1200" b="1" dirty="0">
-                <a:effectLst/>
-                <a:latin typeface="Times New Roman" panose="02020603050405020304" pitchFamily="18" charset="0"/>
-                <a:cs typeface="Times New Roman" panose="02020603050405020304" pitchFamily="18" charset="0"/>
-              </a:rPr>
-              <a:t>==</a:t>
-            </a:r>
-            <a:r>
-              <a:rPr lang="en-US" sz="1200" dirty="0">
-                <a:effectLst/>
-                <a:latin typeface="Times New Roman" panose="02020603050405020304" pitchFamily="18" charset="0"/>
-                <a:cs typeface="Times New Roman" panose="02020603050405020304" pitchFamily="18" charset="0"/>
-              </a:rPr>
-              <a:t> cl) </a:t>
-            </a:r>
-            <a:r>
-              <a:rPr lang="en-US" sz="1200" b="1" dirty="0">
-                <a:effectLst/>
-                <a:latin typeface="Times New Roman" panose="02020603050405020304" pitchFamily="18" charset="0"/>
-                <a:cs typeface="Times New Roman" panose="02020603050405020304" pitchFamily="18" charset="0"/>
-              </a:rPr>
-              <a:t>&amp;&amp;</a:t>
-            </a:r>
-            <a:r>
-              <a:rPr lang="en-US" sz="1200" dirty="0">
-                <a:effectLst/>
-                <a:latin typeface="Times New Roman" panose="02020603050405020304" pitchFamily="18" charset="0"/>
-                <a:cs typeface="Times New Roman" panose="02020603050405020304" pitchFamily="18" charset="0"/>
-              </a:rPr>
-              <a:t> (cl </a:t>
-            </a:r>
-            <a:r>
-              <a:rPr lang="en-US" sz="1200" b="1" dirty="0">
-                <a:effectLst/>
-                <a:latin typeface="Times New Roman" panose="02020603050405020304" pitchFamily="18" charset="0"/>
-                <a:cs typeface="Times New Roman" panose="02020603050405020304" pitchFamily="18" charset="0"/>
-              </a:rPr>
-              <a:t>&lt;</a:t>
-            </a:r>
-            <a:r>
-              <a:rPr lang="en-US" sz="1200" dirty="0">
-                <a:effectLst/>
-                <a:latin typeface="Times New Roman" panose="02020603050405020304" pitchFamily="18" charset="0"/>
-                <a:cs typeface="Times New Roman" panose="02020603050405020304" pitchFamily="18" charset="0"/>
-              </a:rPr>
-              <a:t> TM));</a:t>
-            </a:r>
-          </a:p>
-          <a:p>
-            <a:pPr marL="0" marR="0">
-              <a:spcBef>
-                <a:spcPts val="0"/>
-              </a:spcBef>
-              <a:spcAft>
-                <a:spcPts val="0"/>
-              </a:spcAft>
-            </a:pPr>
-            <a:r>
-              <a:rPr lang="en-US" sz="1200" b="1" dirty="0">
-                <a:effectLst/>
-                <a:latin typeface="Times New Roman" panose="02020603050405020304" pitchFamily="18" charset="0"/>
-                <a:cs typeface="Times New Roman" panose="02020603050405020304" pitchFamily="18" charset="0"/>
-              </a:rPr>
-              <a:t>input</a:t>
-            </a:r>
-            <a:r>
-              <a:rPr lang="en-US" sz="1200" dirty="0">
-                <a:effectLst/>
-                <a:latin typeface="Times New Roman" panose="02020603050405020304" pitchFamily="18" charset="0"/>
-                <a:cs typeface="Times New Roman" panose="02020603050405020304" pitchFamily="18" charset="0"/>
-              </a:rPr>
-              <a:t> Out($1);</a:t>
-            </a:r>
-          </a:p>
-          <a:p>
-            <a:pPr marL="0" marR="0">
-              <a:spcBef>
-                <a:spcPts val="0"/>
-              </a:spcBef>
-              <a:spcAft>
-                <a:spcPts val="0"/>
-              </a:spcAft>
-            </a:pPr>
-            <a:r>
-              <a:rPr lang="en-US" sz="1200" b="1" dirty="0">
-                <a:effectLst/>
-                <a:latin typeface="Times New Roman" panose="02020603050405020304" pitchFamily="18" charset="0"/>
-                <a:cs typeface="Times New Roman" panose="02020603050405020304" pitchFamily="18" charset="0"/>
-              </a:rPr>
-              <a:t>guard</a:t>
-            </a:r>
-            <a:r>
-              <a:rPr lang="en-US" sz="1200" dirty="0">
-                <a:effectLst/>
-                <a:latin typeface="Times New Roman" panose="02020603050405020304" pitchFamily="18" charset="0"/>
-                <a:cs typeface="Times New Roman" panose="02020603050405020304" pitchFamily="18" charset="0"/>
-              </a:rPr>
-              <a:t> (((#2 </a:t>
-            </a:r>
-            <a:r>
-              <a:rPr lang="en-US" sz="1200" b="1" dirty="0">
-                <a:effectLst/>
-                <a:latin typeface="Times New Roman" panose="02020603050405020304" pitchFamily="18" charset="0"/>
-                <a:cs typeface="Times New Roman" panose="02020603050405020304" pitchFamily="18" charset="0"/>
-              </a:rPr>
-              <a:t>+</a:t>
-            </a:r>
-            <a:r>
-              <a:rPr lang="en-US" sz="1200" dirty="0">
-                <a:effectLst/>
-                <a:latin typeface="Times New Roman" panose="02020603050405020304" pitchFamily="18" charset="0"/>
-                <a:cs typeface="Times New Roman" panose="02020603050405020304" pitchFamily="18" charset="0"/>
-              </a:rPr>
-              <a:t> x1) </a:t>
-            </a:r>
-            <a:r>
-              <a:rPr lang="en-US" sz="1200" b="1" dirty="0">
-                <a:effectLst/>
-                <a:latin typeface="Times New Roman" panose="02020603050405020304" pitchFamily="18" charset="0"/>
-                <a:cs typeface="Times New Roman" panose="02020603050405020304" pitchFamily="18" charset="0"/>
-              </a:rPr>
-              <a:t>==</a:t>
-            </a:r>
-            <a:r>
-              <a:rPr lang="en-US" sz="1200" dirty="0">
-                <a:effectLst/>
-                <a:latin typeface="Times New Roman" panose="02020603050405020304" pitchFamily="18" charset="0"/>
-                <a:cs typeface="Times New Roman" panose="02020603050405020304" pitchFamily="18" charset="0"/>
-              </a:rPr>
-              <a:t> 42) </a:t>
-            </a:r>
-            <a:r>
-              <a:rPr lang="en-US" sz="1200" b="1" dirty="0">
-                <a:effectLst/>
-                <a:latin typeface="Times New Roman" panose="02020603050405020304" pitchFamily="18" charset="0"/>
-                <a:cs typeface="Times New Roman" panose="02020603050405020304" pitchFamily="18" charset="0"/>
-              </a:rPr>
-              <a:t>&amp;&amp;</a:t>
-            </a:r>
-            <a:r>
-              <a:rPr lang="en-US" sz="1200" dirty="0">
-                <a:effectLst/>
-                <a:latin typeface="Times New Roman" panose="02020603050405020304" pitchFamily="18" charset="0"/>
-                <a:cs typeface="Times New Roman" panose="02020603050405020304" pitchFamily="18" charset="0"/>
-              </a:rPr>
-              <a:t> </a:t>
-            </a:r>
-          </a:p>
-          <a:p>
-            <a:pPr marL="0" marR="0">
-              <a:spcBef>
-                <a:spcPts val="0"/>
-              </a:spcBef>
-              <a:spcAft>
-                <a:spcPts val="0"/>
-              </a:spcAft>
-            </a:pPr>
-            <a:r>
-              <a:rPr lang="en-US" sz="1200" dirty="0">
-                <a:effectLst/>
-                <a:latin typeface="Times New Roman" panose="02020603050405020304" pitchFamily="18" charset="0"/>
-                <a:cs typeface="Times New Roman" panose="02020603050405020304" pitchFamily="18" charset="0"/>
-              </a:rPr>
-              <a:t>($1 == 0));</a:t>
-            </a:r>
-          </a:p>
-        </p:txBody>
-      </p:sp>
-      <p:sp>
-        <p:nvSpPr>
-          <p:cNvPr id="94" name="ZoneTexte 93">
-            <a:extLst>
-              <a:ext uri="{FF2B5EF4-FFF2-40B4-BE49-F238E27FC236}">
-                <a16:creationId xmlns:a16="http://schemas.microsoft.com/office/drawing/2014/main" id="{4C7FDA69-031E-4B82-B848-0522D3E6E9F2}"/>
-              </a:ext>
-            </a:extLst>
-          </p:cNvPr>
-          <p:cNvSpPr txBox="1"/>
-          <p:nvPr/>
-        </p:nvSpPr>
-        <p:spPr>
-          <a:xfrm>
-            <a:off x="2018080" y="4537094"/>
-            <a:ext cx="2479675" cy="830997"/>
-          </a:xfrm>
-          <a:prstGeom prst="rect">
-            <a:avLst/>
-          </a:prstGeom>
-          <a:noFill/>
-        </p:spPr>
-        <p:txBody>
-          <a:bodyPr wrap="square">
-            <a:spAutoFit/>
-          </a:bodyPr>
-          <a:lstStyle/>
-          <a:p>
-            <a:pPr marL="0" marR="0">
-              <a:spcBef>
-                <a:spcPts val="0"/>
-              </a:spcBef>
-              <a:spcAft>
-                <a:spcPts val="0"/>
-              </a:spcAft>
-            </a:pPr>
-            <a:r>
-              <a:rPr lang="en-US" sz="1200" b="1" dirty="0" err="1">
-                <a:effectLst/>
-                <a:latin typeface="Times New Roman" panose="02020603050405020304" pitchFamily="18" charset="0"/>
-                <a:cs typeface="Times New Roman" panose="02020603050405020304" pitchFamily="18" charset="0"/>
-              </a:rPr>
-              <a:t>tguard</a:t>
-            </a:r>
-            <a:r>
-              <a:rPr lang="en-US" sz="1200" dirty="0">
-                <a:effectLst/>
-                <a:latin typeface="Times New Roman" panose="02020603050405020304" pitchFamily="18" charset="0"/>
-                <a:cs typeface="Times New Roman" panose="02020603050405020304" pitchFamily="18" charset="0"/>
-              </a:rPr>
-              <a:t> ((#2 </a:t>
-            </a:r>
-            <a:r>
-              <a:rPr lang="en-US" sz="1200" b="1" dirty="0">
-                <a:effectLst/>
-                <a:latin typeface="Times New Roman" panose="02020603050405020304" pitchFamily="18" charset="0"/>
-                <a:cs typeface="Times New Roman" panose="02020603050405020304" pitchFamily="18" charset="0"/>
-              </a:rPr>
-              <a:t>==</a:t>
-            </a:r>
-            <a:r>
-              <a:rPr lang="en-US" sz="1200" dirty="0">
-                <a:effectLst/>
-                <a:latin typeface="Times New Roman" panose="02020603050405020304" pitchFamily="18" charset="0"/>
-                <a:cs typeface="Times New Roman" panose="02020603050405020304" pitchFamily="18" charset="0"/>
-              </a:rPr>
-              <a:t> cl) &amp;&amp; (cl </a:t>
-            </a:r>
-            <a:r>
-              <a:rPr lang="en-US" sz="1200" b="1" dirty="0">
-                <a:effectLst/>
-                <a:latin typeface="Times New Roman" panose="02020603050405020304" pitchFamily="18" charset="0"/>
-                <a:cs typeface="Times New Roman" panose="02020603050405020304" pitchFamily="18" charset="0"/>
-              </a:rPr>
-              <a:t>&lt;</a:t>
-            </a:r>
-            <a:r>
-              <a:rPr lang="en-US" sz="1200" dirty="0">
-                <a:effectLst/>
-                <a:latin typeface="Times New Roman" panose="02020603050405020304" pitchFamily="18" charset="0"/>
-                <a:cs typeface="Times New Roman" panose="02020603050405020304" pitchFamily="18" charset="0"/>
-              </a:rPr>
-              <a:t> TM));</a:t>
-            </a:r>
-          </a:p>
-          <a:p>
-            <a:pPr marL="0" marR="0">
-              <a:spcBef>
-                <a:spcPts val="0"/>
-              </a:spcBef>
-              <a:spcAft>
-                <a:spcPts val="0"/>
-              </a:spcAft>
-            </a:pPr>
-            <a:r>
-              <a:rPr lang="en-US" sz="1200" b="1" dirty="0">
-                <a:effectLst/>
-                <a:latin typeface="Times New Roman" panose="02020603050405020304" pitchFamily="18" charset="0"/>
-                <a:cs typeface="Times New Roman" panose="02020603050405020304" pitchFamily="18" charset="0"/>
-              </a:rPr>
-              <a:t>input</a:t>
-            </a:r>
-            <a:r>
-              <a:rPr lang="en-US" sz="1200" dirty="0">
-                <a:effectLst/>
-                <a:latin typeface="Times New Roman" panose="02020603050405020304" pitchFamily="18" charset="0"/>
-                <a:cs typeface="Times New Roman" panose="02020603050405020304" pitchFamily="18" charset="0"/>
-              </a:rPr>
-              <a:t> Out($1);</a:t>
-            </a:r>
-          </a:p>
-          <a:p>
-            <a:pPr marL="0" marR="0">
-              <a:spcBef>
-                <a:spcPts val="0"/>
-              </a:spcBef>
-              <a:spcAft>
-                <a:spcPts val="0"/>
-              </a:spcAft>
-            </a:pPr>
-            <a:r>
-              <a:rPr lang="en-US" sz="1200" b="1" dirty="0">
-                <a:effectLst/>
-                <a:latin typeface="Times New Roman" panose="02020603050405020304" pitchFamily="18" charset="0"/>
-                <a:cs typeface="Times New Roman" panose="02020603050405020304" pitchFamily="18" charset="0"/>
-              </a:rPr>
-              <a:t>guard</a:t>
-            </a:r>
-            <a:r>
-              <a:rPr lang="en-US" sz="1200" dirty="0">
-                <a:effectLst/>
-                <a:latin typeface="Times New Roman" panose="02020603050405020304" pitchFamily="18" charset="0"/>
-                <a:cs typeface="Times New Roman" panose="02020603050405020304" pitchFamily="18" charset="0"/>
-              </a:rPr>
-              <a:t> (((#2 + x1) </a:t>
-            </a:r>
-            <a:r>
-              <a:rPr lang="en-US" sz="1200" b="1" dirty="0">
-                <a:effectLst/>
-                <a:latin typeface="Times New Roman" panose="02020603050405020304" pitchFamily="18" charset="0"/>
-                <a:cs typeface="Times New Roman" panose="02020603050405020304" pitchFamily="18" charset="0"/>
-              </a:rPr>
-              <a:t>!=</a:t>
-            </a:r>
-            <a:r>
-              <a:rPr lang="en-US" sz="1200" dirty="0">
-                <a:effectLst/>
-                <a:latin typeface="Times New Roman" panose="02020603050405020304" pitchFamily="18" charset="0"/>
-                <a:cs typeface="Times New Roman" panose="02020603050405020304" pitchFamily="18" charset="0"/>
-              </a:rPr>
-              <a:t> 42) </a:t>
-            </a:r>
-            <a:r>
-              <a:rPr lang="en-US" sz="1200" b="1" dirty="0">
-                <a:effectLst/>
-                <a:latin typeface="Times New Roman" panose="02020603050405020304" pitchFamily="18" charset="0"/>
-                <a:cs typeface="Times New Roman" panose="02020603050405020304" pitchFamily="18" charset="0"/>
-              </a:rPr>
-              <a:t>||</a:t>
-            </a:r>
-            <a:r>
-              <a:rPr lang="en-US" sz="1200" dirty="0">
-                <a:effectLst/>
-                <a:latin typeface="Times New Roman" panose="02020603050405020304" pitchFamily="18" charset="0"/>
-                <a:cs typeface="Times New Roman" panose="02020603050405020304" pitchFamily="18" charset="0"/>
-              </a:rPr>
-              <a:t> </a:t>
-            </a:r>
-          </a:p>
-          <a:p>
-            <a:pPr marL="0" marR="0">
-              <a:spcBef>
-                <a:spcPts val="0"/>
-              </a:spcBef>
-              <a:spcAft>
-                <a:spcPts val="0"/>
-              </a:spcAft>
-            </a:pPr>
-            <a:r>
-              <a:rPr lang="en-US" sz="1200" dirty="0">
-                <a:effectLst/>
-                <a:latin typeface="Times New Roman" panose="02020603050405020304" pitchFamily="18" charset="0"/>
-                <a:cs typeface="Times New Roman" panose="02020603050405020304" pitchFamily="18" charset="0"/>
-              </a:rPr>
-              <a:t>($1 </a:t>
-            </a:r>
-            <a:r>
-              <a:rPr lang="en-US" sz="1200" b="1" dirty="0">
-                <a:effectLst/>
-                <a:latin typeface="Times New Roman" panose="02020603050405020304" pitchFamily="18" charset="0"/>
-                <a:cs typeface="Times New Roman" panose="02020603050405020304" pitchFamily="18" charset="0"/>
-              </a:rPr>
-              <a:t>!=</a:t>
-            </a:r>
-            <a:r>
-              <a:rPr lang="en-US" sz="1200" dirty="0">
-                <a:effectLst/>
-                <a:latin typeface="Times New Roman" panose="02020603050405020304" pitchFamily="18" charset="0"/>
-                <a:cs typeface="Times New Roman" panose="02020603050405020304" pitchFamily="18" charset="0"/>
-              </a:rPr>
-              <a:t> 0));</a:t>
-            </a:r>
-          </a:p>
-        </p:txBody>
-      </p:sp>
-      <p:sp>
-        <p:nvSpPr>
-          <p:cNvPr id="96" name="ZoneTexte 95">
-            <a:extLst>
-              <a:ext uri="{FF2B5EF4-FFF2-40B4-BE49-F238E27FC236}">
-                <a16:creationId xmlns:a16="http://schemas.microsoft.com/office/drawing/2014/main" id="{806DFBF6-7E0F-48B3-831B-8F72CD379877}"/>
-              </a:ext>
-            </a:extLst>
-          </p:cNvPr>
-          <p:cNvSpPr txBox="1"/>
-          <p:nvPr/>
-        </p:nvSpPr>
-        <p:spPr>
-          <a:xfrm>
-            <a:off x="5851556" y="4160306"/>
-            <a:ext cx="2086019" cy="369332"/>
-          </a:xfrm>
-          <a:prstGeom prst="rect">
-            <a:avLst/>
-          </a:prstGeom>
-          <a:noFill/>
-        </p:spPr>
-        <p:txBody>
-          <a:bodyPr wrap="square">
-            <a:spAutoFit/>
-          </a:bodyPr>
-          <a:lstStyle/>
-          <a:p>
-            <a:r>
-              <a:rPr lang="en-US" sz="1800" dirty="0">
-                <a:effectLst/>
-                <a:latin typeface="Times New Roman" panose="02020603050405020304" pitchFamily="18" charset="0"/>
-                <a:cs typeface="Times New Roman" panose="02020603050405020304" pitchFamily="18" charset="0"/>
-              </a:rPr>
-              <a:t>TM = 60 time</a:t>
-            </a:r>
-            <a:endParaRPr lang="fr-FR" dirty="0"/>
-          </a:p>
-        </p:txBody>
-      </p:sp>
-      <p:cxnSp>
-        <p:nvCxnSpPr>
-          <p:cNvPr id="104" name="Connecteur droit avec flèche 103">
-            <a:extLst>
-              <a:ext uri="{FF2B5EF4-FFF2-40B4-BE49-F238E27FC236}">
-                <a16:creationId xmlns:a16="http://schemas.microsoft.com/office/drawing/2014/main" id="{99B26CFA-0E8F-4677-B8C6-FE779A6F12D0}"/>
-              </a:ext>
-            </a:extLst>
-          </p:cNvPr>
-          <p:cNvCxnSpPr>
-            <a:cxnSpLocks/>
-            <a:stCxn id="80" idx="4"/>
-            <a:endCxn id="105" idx="0"/>
-          </p:cNvCxnSpPr>
-          <p:nvPr/>
-        </p:nvCxnSpPr>
-        <p:spPr>
-          <a:xfrm>
-            <a:off x="1001835" y="4339478"/>
-            <a:ext cx="8460" cy="1649203"/>
-          </a:xfrm>
-          <a:prstGeom prst="straightConnector1">
-            <a:avLst/>
-          </a:prstGeom>
-          <a:ln w="38100">
-            <a:solidFill>
-              <a:srgbClr val="FF0000"/>
-            </a:solidFill>
-            <a:prstDash val="solid"/>
-            <a:headEnd type="none" w="med" len="med"/>
-            <a:tailEnd type="arrow" w="med" len="med"/>
-          </a:ln>
-          <a:extLst>
-            <a:ext uri="{909E8E84-426E-40DD-AFC4-6F175D3DCCD1}">
-              <a14:hiddenFill xmlns:a14="http://schemas.microsoft.com/office/drawing/2010/main">
-                <a:noFill/>
-              </a14:hiddenFill>
-            </a:ext>
-          </a:extLst>
-        </p:spPr>
-        <p:style>
-          <a:lnRef idx="1">
-            <a:schemeClr val="accent1"/>
-          </a:lnRef>
-          <a:fillRef idx="0">
-            <a:schemeClr val="accent1"/>
-          </a:fillRef>
-          <a:effectRef idx="0">
-            <a:schemeClr val="accent1"/>
-          </a:effectRef>
-          <a:fontRef idx="minor">
-            <a:schemeClr val="tx1"/>
-          </a:fontRef>
-        </p:style>
-      </p:cxnSp>
-      <p:sp>
-        <p:nvSpPr>
-          <p:cNvPr id="105" name="Rectangle 104">
-            <a:extLst>
-              <a:ext uri="{FF2B5EF4-FFF2-40B4-BE49-F238E27FC236}">
-                <a16:creationId xmlns:a16="http://schemas.microsoft.com/office/drawing/2014/main" id="{E7AC93BC-6827-4FF8-84BB-7CFDD0D1AC2F}"/>
-              </a:ext>
-            </a:extLst>
-          </p:cNvPr>
-          <p:cNvSpPr/>
-          <p:nvPr/>
-        </p:nvSpPr>
-        <p:spPr>
-          <a:xfrm>
-            <a:off x="550329" y="5988681"/>
-            <a:ext cx="919932" cy="307777"/>
-          </a:xfrm>
-          <a:prstGeom prst="rect">
-            <a:avLst/>
-          </a:prstGeom>
-          <a:ln>
-            <a:noFill/>
-          </a:ln>
-        </p:spPr>
-        <p:txBody>
-          <a:bodyPr wrap="none">
-            <a:spAutoFit/>
-          </a:bodyPr>
-          <a:lstStyle/>
-          <a:p>
-            <a:pPr lvl="0" algn="ctr"/>
-            <a:r>
-              <a:rPr lang="fr-FR" sz="1400" dirty="0">
-                <a:solidFill>
-                  <a:srgbClr val="FF0000"/>
-                </a:solidFill>
-              </a:rPr>
-              <a:t> </a:t>
-            </a:r>
-            <a:r>
-              <a:rPr lang="fr-FR" sz="1400" b="1" dirty="0" err="1">
-                <a:solidFill>
-                  <a:srgbClr val="FF0000"/>
-                </a:solidFill>
-                <a:latin typeface="Times New Roman" panose="02020603050405020304" pitchFamily="18" charset="0"/>
-                <a:cs typeface="Times New Roman" panose="02020603050405020304" pitchFamily="18" charset="0"/>
-              </a:rPr>
-              <a:t>FAILdur</a:t>
-            </a:r>
-            <a:endParaRPr lang="en-US" sz="1400" baseline="30000" dirty="0">
-              <a:solidFill>
-                <a:srgbClr val="FF0000"/>
-              </a:solidFill>
-            </a:endParaRPr>
-          </a:p>
-        </p:txBody>
-      </p:sp>
-      <p:cxnSp>
-        <p:nvCxnSpPr>
-          <p:cNvPr id="115" name="Connecteur droit avec flèche 114">
-            <a:extLst>
-              <a:ext uri="{FF2B5EF4-FFF2-40B4-BE49-F238E27FC236}">
-                <a16:creationId xmlns:a16="http://schemas.microsoft.com/office/drawing/2014/main" id="{B9BCD748-51A9-4121-BE80-B0C859426F47}"/>
-              </a:ext>
-            </a:extLst>
-          </p:cNvPr>
-          <p:cNvCxnSpPr>
-            <a:cxnSpLocks/>
-            <a:stCxn id="80" idx="0"/>
-          </p:cNvCxnSpPr>
-          <p:nvPr/>
-        </p:nvCxnSpPr>
-        <p:spPr>
-          <a:xfrm flipV="1">
-            <a:off x="1001835" y="3536433"/>
-            <a:ext cx="349008" cy="306358"/>
-          </a:xfrm>
-          <a:prstGeom prst="straightConnector1">
-            <a:avLst/>
-          </a:prstGeom>
-          <a:ln w="38100">
-            <a:solidFill>
-              <a:srgbClr val="FFC000"/>
-            </a:solidFill>
-            <a:prstDash val="sysDash"/>
-            <a:headEnd type="none" w="med" len="med"/>
-            <a:tailEnd type="arrow" w="med" len="med"/>
-          </a:ln>
-          <a:extLst>
-            <a:ext uri="{909E8E84-426E-40DD-AFC4-6F175D3DCCD1}">
-              <a14:hiddenFill xmlns:a14="http://schemas.microsoft.com/office/drawing/2010/main">
-                <a:noFill/>
-              </a14:hiddenFill>
-            </a:ext>
-          </a:extLst>
-        </p:spPr>
-        <p:style>
-          <a:lnRef idx="1">
-            <a:schemeClr val="accent1"/>
-          </a:lnRef>
-          <a:fillRef idx="0">
-            <a:schemeClr val="accent1"/>
-          </a:fillRef>
-          <a:effectRef idx="0">
-            <a:schemeClr val="accent1"/>
-          </a:effectRef>
-          <a:fontRef idx="minor">
-            <a:schemeClr val="tx1"/>
-          </a:fontRef>
-        </p:style>
-      </p:cxnSp>
-      <p:sp>
-        <p:nvSpPr>
-          <p:cNvPr id="120" name="ZoneTexte 119">
-            <a:extLst>
-              <a:ext uri="{FF2B5EF4-FFF2-40B4-BE49-F238E27FC236}">
-                <a16:creationId xmlns:a16="http://schemas.microsoft.com/office/drawing/2014/main" id="{02ED0638-D32E-43D9-BBF4-0183F2C189F4}"/>
-              </a:ext>
-            </a:extLst>
-          </p:cNvPr>
-          <p:cNvSpPr txBox="1"/>
-          <p:nvPr/>
-        </p:nvSpPr>
-        <p:spPr>
-          <a:xfrm>
-            <a:off x="-1365223" y="5051499"/>
-            <a:ext cx="2709261" cy="1015663"/>
-          </a:xfrm>
-          <a:prstGeom prst="rect">
-            <a:avLst/>
-          </a:prstGeom>
-          <a:noFill/>
-        </p:spPr>
-        <p:txBody>
-          <a:bodyPr wrap="square">
-            <a:spAutoFit/>
-          </a:bodyPr>
-          <a:lstStyle/>
-          <a:p>
-            <a:pPr marL="0" marR="0">
-              <a:spcBef>
-                <a:spcPts val="0"/>
-              </a:spcBef>
-              <a:spcAft>
-                <a:spcPts val="0"/>
-              </a:spcAft>
-            </a:pPr>
-            <a:r>
-              <a:rPr lang="en-US" sz="1200" b="1" dirty="0" err="1">
-                <a:effectLst/>
-                <a:latin typeface="Times New Roman" panose="02020603050405020304" pitchFamily="18" charset="0"/>
-                <a:cs typeface="Times New Roman" panose="02020603050405020304" pitchFamily="18" charset="0"/>
-              </a:rPr>
-              <a:t>tguard</a:t>
-            </a:r>
-            <a:r>
-              <a:rPr lang="en-US" sz="1200" dirty="0">
-                <a:effectLst/>
-                <a:latin typeface="Times New Roman" panose="02020603050405020304" pitchFamily="18" charset="0"/>
-                <a:cs typeface="Times New Roman" panose="02020603050405020304" pitchFamily="18" charset="0"/>
-              </a:rPr>
-              <a:t> ((#2 == cl) &amp;&amp; (cl &gt;= TM));</a:t>
-            </a:r>
-          </a:p>
-          <a:p>
-            <a:pPr marL="0" marR="0">
-              <a:spcBef>
-                <a:spcPts val="0"/>
-              </a:spcBef>
-              <a:spcAft>
-                <a:spcPts val="0"/>
-              </a:spcAft>
-            </a:pPr>
-            <a:r>
-              <a:rPr lang="en-US" sz="1200" b="1" dirty="0">
-                <a:effectLst/>
-                <a:latin typeface="Times New Roman" panose="02020603050405020304" pitchFamily="18" charset="0"/>
-                <a:cs typeface="Times New Roman" panose="02020603050405020304" pitchFamily="18" charset="0"/>
-              </a:rPr>
-              <a:t>input</a:t>
-            </a:r>
-            <a:r>
-              <a:rPr lang="en-US" sz="1200" dirty="0">
-                <a:effectLst/>
-                <a:latin typeface="Times New Roman" panose="02020603050405020304" pitchFamily="18" charset="0"/>
-                <a:cs typeface="Times New Roman" panose="02020603050405020304" pitchFamily="18" charset="0"/>
-              </a:rPr>
-              <a:t> Quiescence;</a:t>
-            </a:r>
-          </a:p>
-          <a:p>
-            <a:pPr marL="0" marR="0">
-              <a:spcBef>
-                <a:spcPts val="0"/>
-              </a:spcBef>
-              <a:spcAft>
-                <a:spcPts val="0"/>
-              </a:spcAft>
-            </a:pPr>
-            <a:r>
-              <a:rPr lang="en-US" sz="1200" b="1" dirty="0">
-                <a:effectLst/>
-                <a:latin typeface="Times New Roman" panose="02020603050405020304" pitchFamily="18" charset="0"/>
-                <a:cs typeface="Times New Roman" panose="02020603050405020304" pitchFamily="18" charset="0"/>
-              </a:rPr>
-              <a:t>guard</a:t>
-            </a:r>
-            <a:r>
-              <a:rPr lang="en-US" sz="1200" dirty="0">
-                <a:effectLst/>
-                <a:latin typeface="Times New Roman" panose="02020603050405020304" pitchFamily="18" charset="0"/>
-                <a:cs typeface="Times New Roman" panose="02020603050405020304" pitchFamily="18" charset="0"/>
-              </a:rPr>
-              <a:t> </a:t>
-            </a:r>
-            <a:r>
-              <a:rPr lang="en-US" sz="1200" b="1" dirty="0" err="1">
-                <a:effectLst/>
-                <a:latin typeface="Times New Roman" panose="02020603050405020304" pitchFamily="18" charset="0"/>
-                <a:cs typeface="Times New Roman" panose="02020603050405020304" pitchFamily="18" charset="0"/>
-              </a:rPr>
-              <a:t>forall</a:t>
-            </a:r>
-            <a:r>
-              <a:rPr lang="en-US" sz="1200" dirty="0">
-                <a:effectLst/>
-                <a:latin typeface="Times New Roman" panose="02020603050405020304" pitchFamily="18" charset="0"/>
-                <a:cs typeface="Times New Roman" panose="02020603050405020304" pitchFamily="18" charset="0"/>
-              </a:rPr>
-              <a:t>&lt; # : </a:t>
-            </a:r>
-            <a:r>
-              <a:rPr lang="en-US" sz="1200" b="1" dirty="0" err="1">
-                <a:effectLst/>
-                <a:latin typeface="Times New Roman" panose="02020603050405020304" pitchFamily="18" charset="0"/>
-                <a:cs typeface="Times New Roman" panose="02020603050405020304" pitchFamily="18" charset="0"/>
-              </a:rPr>
-              <a:t>urational</a:t>
-            </a:r>
-            <a:r>
-              <a:rPr lang="en-US" sz="1200" dirty="0">
-                <a:effectLst/>
-                <a:latin typeface="Times New Roman" panose="02020603050405020304" pitchFamily="18" charset="0"/>
-                <a:cs typeface="Times New Roman" panose="02020603050405020304" pitchFamily="18" charset="0"/>
-              </a:rPr>
-              <a:t> , $1 : </a:t>
-            </a:r>
-            <a:r>
-              <a:rPr lang="en-US" sz="1200" b="1" dirty="0" err="1">
-                <a:effectLst/>
-                <a:latin typeface="Times New Roman" panose="02020603050405020304" pitchFamily="18" charset="0"/>
-                <a:cs typeface="Times New Roman" panose="02020603050405020304" pitchFamily="18" charset="0"/>
-              </a:rPr>
-              <a:t>urational</a:t>
-            </a:r>
-            <a:r>
-              <a:rPr lang="en-US" sz="1200" dirty="0">
-                <a:effectLst/>
-                <a:latin typeface="Times New Roman" panose="02020603050405020304" pitchFamily="18" charset="0"/>
-                <a:cs typeface="Times New Roman" panose="02020603050405020304" pitchFamily="18" charset="0"/>
-              </a:rPr>
-              <a:t> &gt;(((# + x1) != 42) || </a:t>
-            </a:r>
-          </a:p>
-          <a:p>
-            <a:pPr marL="0" marR="0">
-              <a:spcBef>
-                <a:spcPts val="0"/>
-              </a:spcBef>
-              <a:spcAft>
-                <a:spcPts val="0"/>
-              </a:spcAft>
-            </a:pPr>
-            <a:r>
-              <a:rPr lang="en-US" sz="1200" dirty="0">
-                <a:effectLst/>
-                <a:latin typeface="Times New Roman" panose="02020603050405020304" pitchFamily="18" charset="0"/>
-                <a:cs typeface="Times New Roman" panose="02020603050405020304" pitchFamily="18" charset="0"/>
-              </a:rPr>
-              <a:t>($1 != 0) || (#2 &gt;= #));</a:t>
-            </a:r>
-          </a:p>
-        </p:txBody>
-      </p:sp>
-      <p:cxnSp>
-        <p:nvCxnSpPr>
-          <p:cNvPr id="126" name="Connecteur droit avec flèche 125">
-            <a:extLst>
-              <a:ext uri="{FF2B5EF4-FFF2-40B4-BE49-F238E27FC236}">
-                <a16:creationId xmlns:a16="http://schemas.microsoft.com/office/drawing/2014/main" id="{3EEC791C-F08F-4D9C-B716-F3ACDC888FCF}"/>
-              </a:ext>
-            </a:extLst>
-          </p:cNvPr>
-          <p:cNvCxnSpPr>
-            <a:cxnSpLocks/>
-            <a:stCxn id="78" idx="5"/>
-          </p:cNvCxnSpPr>
-          <p:nvPr/>
-        </p:nvCxnSpPr>
-        <p:spPr>
-          <a:xfrm>
-            <a:off x="-1214302" y="4266740"/>
-            <a:ext cx="263574" cy="360810"/>
-          </a:xfrm>
-          <a:prstGeom prst="straightConnector1">
-            <a:avLst/>
-          </a:prstGeom>
-          <a:ln w="38100">
-            <a:solidFill>
-              <a:srgbClr val="FF0000"/>
-            </a:solidFill>
-            <a:prstDash val="sysDash"/>
-            <a:headEnd type="none" w="med" len="med"/>
-            <a:tailEnd type="arrow" w="med" len="med"/>
-          </a:ln>
-          <a:extLst>
-            <a:ext uri="{909E8E84-426E-40DD-AFC4-6F175D3DCCD1}">
-              <a14:hiddenFill xmlns:a14="http://schemas.microsoft.com/office/drawing/2010/main">
-                <a:noFill/>
-              </a14:hiddenFill>
-            </a:ext>
-          </a:extLst>
-        </p:spPr>
-        <p:style>
-          <a:lnRef idx="1">
-            <a:schemeClr val="accent1"/>
-          </a:lnRef>
-          <a:fillRef idx="0">
-            <a:schemeClr val="accent1"/>
-          </a:fillRef>
-          <a:effectRef idx="0">
-            <a:schemeClr val="accent1"/>
-          </a:effectRef>
-          <a:fontRef idx="minor">
-            <a:schemeClr val="tx1"/>
-          </a:fontRef>
-        </p:style>
-      </p:cxnSp>
-      <p:sp>
-        <p:nvSpPr>
-          <p:cNvPr id="134" name="Rectangle : coins arrondis 133">
-            <a:extLst>
-              <a:ext uri="{FF2B5EF4-FFF2-40B4-BE49-F238E27FC236}">
-                <a16:creationId xmlns:a16="http://schemas.microsoft.com/office/drawing/2014/main" id="{F57F2429-8C94-4CEA-AC58-E83BEE4144C6}"/>
-              </a:ext>
-            </a:extLst>
-          </p:cNvPr>
-          <p:cNvSpPr/>
-          <p:nvPr/>
-        </p:nvSpPr>
-        <p:spPr>
-          <a:xfrm>
-            <a:off x="5975782" y="4625594"/>
-            <a:ext cx="1230895" cy="527428"/>
-          </a:xfrm>
-          <a:prstGeom prst="roundRect">
-            <a:avLst/>
-          </a:prstGeom>
-          <a:noFill/>
-          <a:ln>
-            <a:solidFill>
-              <a:schemeClr val="tx1"/>
-            </a:solidFill>
-            <a:prstDash val="sysDot"/>
-          </a:ln>
-        </p:spPr>
-        <p:style>
-          <a:lnRef idx="2">
-            <a:schemeClr val="accent1">
-              <a:shade val="50000"/>
-            </a:schemeClr>
-          </a:lnRef>
-          <a:fillRef idx="1">
-            <a:schemeClr val="accent1"/>
-          </a:fillRef>
-          <a:effectRef idx="0">
-            <a:schemeClr val="accent1"/>
-          </a:effectRef>
-          <a:fontRef idx="minor">
-            <a:schemeClr val="lt1"/>
-          </a:fontRef>
-        </p:style>
-        <p:txBody>
-          <a:bodyPr rtlCol="0" anchor="ctr"/>
-          <a:lstStyle/>
-          <a:p>
-            <a:pPr algn="ctr"/>
-            <a:r>
-              <a:rPr lang="fr-FR" sz="1400" b="1" dirty="0">
-                <a:solidFill>
-                  <a:schemeClr val="tx1"/>
-                </a:solidFill>
-              </a:rPr>
-              <a:t>SMT-solver (e.g. Z3)</a:t>
-            </a:r>
-          </a:p>
-        </p:txBody>
-      </p:sp>
-      <p:sp>
-        <p:nvSpPr>
-          <p:cNvPr id="137" name="Rectangle 136">
-            <a:extLst>
-              <a:ext uri="{FF2B5EF4-FFF2-40B4-BE49-F238E27FC236}">
-                <a16:creationId xmlns:a16="http://schemas.microsoft.com/office/drawing/2014/main" id="{D4AE9CD3-5FA4-4040-9706-68410A1513D9}"/>
-              </a:ext>
-            </a:extLst>
-          </p:cNvPr>
-          <p:cNvSpPr/>
-          <p:nvPr/>
-        </p:nvSpPr>
-        <p:spPr>
-          <a:xfrm>
-            <a:off x="5116006" y="3368466"/>
-            <a:ext cx="2148840" cy="678180"/>
-          </a:xfrm>
-          <a:prstGeom prst="rect">
-            <a:avLst/>
-          </a:prstGeom>
-          <a:solidFill>
-            <a:schemeClr val="accent1">
-              <a:lumMod val="20000"/>
-              <a:lumOff val="80000"/>
-            </a:schemeClr>
-          </a:solidFill>
-          <a:ln>
-            <a:solidFill>
-              <a:schemeClr val="tx1"/>
-            </a:solidFill>
-          </a:ln>
-        </p:spPr>
-        <p:style>
-          <a:lnRef idx="2">
-            <a:schemeClr val="accent1">
-              <a:shade val="50000"/>
-            </a:schemeClr>
-          </a:lnRef>
-          <a:fillRef idx="1">
-            <a:schemeClr val="accent1"/>
-          </a:fillRef>
-          <a:effectRef idx="0">
-            <a:schemeClr val="accent1"/>
-          </a:effectRef>
-          <a:fontRef idx="minor">
-            <a:schemeClr val="lt1"/>
-          </a:fontRef>
-        </p:style>
-        <p:txBody>
-          <a:bodyPr rtlCol="0" anchor="ctr"/>
-          <a:lstStyle/>
-          <a:p>
-            <a:pPr algn="ctr"/>
-            <a:r>
-              <a:rPr lang="fr-FR" sz="1600" b="1" dirty="0">
-                <a:solidFill>
-                  <a:schemeClr val="tx1"/>
-                </a:solidFill>
-              </a:rPr>
-              <a:t>Output 1 :</a:t>
-            </a:r>
-          </a:p>
-          <a:p>
-            <a:pPr algn="ctr"/>
-            <a:r>
-              <a:rPr lang="fr-FR" sz="1600" b="1" dirty="0">
-                <a:solidFill>
-                  <a:schemeClr val="tx1"/>
-                </a:solidFill>
-              </a:rPr>
-              <a:t>Test case</a:t>
-            </a:r>
-          </a:p>
-        </p:txBody>
-      </p:sp>
-      <p:cxnSp>
-        <p:nvCxnSpPr>
-          <p:cNvPr id="146" name="Connecteur droit avec flèche 145">
-            <a:extLst>
-              <a:ext uri="{FF2B5EF4-FFF2-40B4-BE49-F238E27FC236}">
-                <a16:creationId xmlns:a16="http://schemas.microsoft.com/office/drawing/2014/main" id="{D78C754B-A566-4D02-84E7-BEECBEDCB708}"/>
-              </a:ext>
-            </a:extLst>
-          </p:cNvPr>
-          <p:cNvCxnSpPr>
-            <a:cxnSpLocks/>
-            <a:endCxn id="147" idx="0"/>
-          </p:cNvCxnSpPr>
-          <p:nvPr/>
-        </p:nvCxnSpPr>
-        <p:spPr>
-          <a:xfrm flipH="1">
-            <a:off x="6305275" y="5595024"/>
-            <a:ext cx="1" cy="234462"/>
-          </a:xfrm>
-          <a:prstGeom prst="straightConnector1">
-            <a:avLst/>
-          </a:prstGeom>
-          <a:ln w="6350">
-            <a:solidFill>
-              <a:schemeClr val="tx1"/>
-            </a:solidFill>
-            <a:prstDash val="lgDashDot"/>
-            <a:tailEnd type="triangle" w="lg" len="lg"/>
-          </a:ln>
-        </p:spPr>
-        <p:style>
-          <a:lnRef idx="1">
-            <a:schemeClr val="accent1"/>
-          </a:lnRef>
-          <a:fillRef idx="0">
-            <a:schemeClr val="accent1"/>
-          </a:fillRef>
-          <a:effectRef idx="0">
-            <a:schemeClr val="accent1"/>
-          </a:effectRef>
-          <a:fontRef idx="minor">
-            <a:schemeClr val="tx1"/>
-          </a:fontRef>
-        </p:style>
-      </p:cxnSp>
-      <p:sp>
-        <p:nvSpPr>
-          <p:cNvPr id="147" name="ZoneTexte 146">
-            <a:extLst>
-              <a:ext uri="{FF2B5EF4-FFF2-40B4-BE49-F238E27FC236}">
-                <a16:creationId xmlns:a16="http://schemas.microsoft.com/office/drawing/2014/main" id="{D6172EAC-A788-4ABD-82B0-290959215C9A}"/>
-              </a:ext>
-            </a:extLst>
-          </p:cNvPr>
-          <p:cNvSpPr txBox="1"/>
-          <p:nvPr/>
-        </p:nvSpPr>
-        <p:spPr>
-          <a:xfrm>
-            <a:off x="4950644" y="5829486"/>
-            <a:ext cx="2709261" cy="646331"/>
-          </a:xfrm>
-          <a:prstGeom prst="rect">
-            <a:avLst/>
-          </a:prstGeom>
-          <a:noFill/>
-        </p:spPr>
-        <p:txBody>
-          <a:bodyPr wrap="square" rtlCol="0">
-            <a:spAutoFit/>
-          </a:bodyPr>
-          <a:lstStyle/>
-          <a:p>
-            <a:pPr algn="ctr"/>
-            <a:r>
-              <a:rPr lang="fr-FR" b="1" dirty="0">
-                <a:latin typeface="Arial" panose="020B0604020202020204" pitchFamily="34" charset="0"/>
-                <a:cs typeface="Arial" panose="020B0604020202020204" pitchFamily="34" charset="0"/>
-              </a:rPr>
-              <a:t>Verdict</a:t>
-            </a:r>
-          </a:p>
-          <a:p>
-            <a:pPr algn="ctr"/>
-            <a:r>
-              <a:rPr lang="fr-FR" b="1" dirty="0">
-                <a:solidFill>
-                  <a:srgbClr val="008000"/>
-                </a:solidFill>
-                <a:latin typeface="Times New Roman" panose="02020603050405020304" pitchFamily="18" charset="0"/>
-                <a:cs typeface="Times New Roman" panose="02020603050405020304" pitchFamily="18" charset="0"/>
-              </a:rPr>
-              <a:t>PASS </a:t>
-            </a:r>
-            <a:r>
-              <a:rPr lang="fr-FR" dirty="0">
-                <a:latin typeface="Arial" panose="020B0604020202020204" pitchFamily="34" charset="0"/>
-                <a:cs typeface="Arial" panose="020B0604020202020204" pitchFamily="34" charset="0"/>
-              </a:rPr>
-              <a:t>/ </a:t>
-            </a:r>
-            <a:r>
-              <a:rPr lang="fr-FR" b="1" dirty="0">
-                <a:solidFill>
-                  <a:srgbClr val="FFC000"/>
-                </a:solidFill>
-                <a:latin typeface="Times New Roman" panose="02020603050405020304" pitchFamily="18" charset="0"/>
-                <a:cs typeface="Times New Roman" panose="02020603050405020304" pitchFamily="18" charset="0"/>
-              </a:rPr>
-              <a:t>INC</a:t>
-            </a:r>
-            <a:r>
-              <a:rPr lang="fr-FR" b="1" dirty="0">
-                <a:solidFill>
-                  <a:schemeClr val="tx2"/>
-                </a:solidFill>
-                <a:latin typeface="Times New Roman" panose="02020603050405020304" pitchFamily="18" charset="0"/>
-                <a:cs typeface="Times New Roman" panose="02020603050405020304" pitchFamily="18" charset="0"/>
-              </a:rPr>
-              <a:t> </a:t>
-            </a:r>
-            <a:r>
-              <a:rPr lang="fr-FR" dirty="0">
-                <a:latin typeface="Arial" panose="020B0604020202020204" pitchFamily="34" charset="0"/>
-                <a:cs typeface="Arial" panose="020B0604020202020204" pitchFamily="34" charset="0"/>
-              </a:rPr>
-              <a:t>/ </a:t>
-            </a:r>
-            <a:r>
-              <a:rPr lang="fr-FR" b="1" dirty="0">
-                <a:solidFill>
-                  <a:srgbClr val="FF0000"/>
-                </a:solidFill>
-                <a:latin typeface="Times New Roman" panose="02020603050405020304" pitchFamily="18" charset="0"/>
-                <a:cs typeface="Times New Roman" panose="02020603050405020304" pitchFamily="18" charset="0"/>
-              </a:rPr>
-              <a:t>FAIL</a:t>
-            </a:r>
-            <a:endParaRPr lang="en-US" b="1" dirty="0">
-              <a:solidFill>
-                <a:srgbClr val="FF0000"/>
-              </a:solidFill>
-              <a:latin typeface="Times New Roman" panose="02020603050405020304" pitchFamily="18" charset="0"/>
-              <a:cs typeface="Times New Roman" panose="02020603050405020304" pitchFamily="18" charset="0"/>
-            </a:endParaRPr>
-          </a:p>
-        </p:txBody>
-      </p:sp>
-      <p:sp>
-        <p:nvSpPr>
-          <p:cNvPr id="149" name="ZoneTexte 148">
-            <a:extLst>
-              <a:ext uri="{FF2B5EF4-FFF2-40B4-BE49-F238E27FC236}">
-                <a16:creationId xmlns:a16="http://schemas.microsoft.com/office/drawing/2014/main" id="{EE437370-87CA-42B9-BBD4-A34C369A0D6A}"/>
-              </a:ext>
-            </a:extLst>
-          </p:cNvPr>
-          <p:cNvSpPr txBox="1"/>
-          <p:nvPr/>
-        </p:nvSpPr>
-        <p:spPr>
-          <a:xfrm>
-            <a:off x="3021228" y="5214047"/>
-            <a:ext cx="6432550" cy="369332"/>
-          </a:xfrm>
-          <a:prstGeom prst="rect">
-            <a:avLst/>
-          </a:prstGeom>
-          <a:noFill/>
-        </p:spPr>
-        <p:txBody>
-          <a:bodyPr wrap="square">
-            <a:spAutoFit/>
-          </a:bodyPr>
-          <a:lstStyle/>
-          <a:p>
-            <a:pPr algn="ctr"/>
-            <a:r>
-              <a:rPr lang="fr-FR" sz="1800" b="1" dirty="0">
-                <a:solidFill>
-                  <a:schemeClr val="tx1"/>
-                </a:solidFill>
-              </a:rPr>
-              <a:t>Test instrumentation</a:t>
-            </a:r>
-          </a:p>
-        </p:txBody>
-      </p:sp>
-      <p:sp>
-        <p:nvSpPr>
-          <p:cNvPr id="156" name="ZoneTexte 155">
-            <a:extLst>
-              <a:ext uri="{FF2B5EF4-FFF2-40B4-BE49-F238E27FC236}">
-                <a16:creationId xmlns:a16="http://schemas.microsoft.com/office/drawing/2014/main" id="{A169FB8B-26A3-4F69-BE8B-98B0CB4D5D95}"/>
-              </a:ext>
-            </a:extLst>
-          </p:cNvPr>
-          <p:cNvSpPr txBox="1"/>
-          <p:nvPr/>
-        </p:nvSpPr>
-        <p:spPr>
-          <a:xfrm>
-            <a:off x="-2779008" y="2191206"/>
-            <a:ext cx="1831495" cy="584775"/>
-          </a:xfrm>
-          <a:prstGeom prst="rect">
-            <a:avLst/>
-          </a:prstGeom>
-          <a:noFill/>
-        </p:spPr>
-        <p:txBody>
-          <a:bodyPr wrap="square">
-            <a:spAutoFit/>
-          </a:bodyPr>
-          <a:lstStyle/>
-          <a:p>
-            <a:pPr algn="ctr"/>
-            <a:r>
-              <a:rPr lang="fr-FR" sz="1600" b="1" dirty="0">
-                <a:solidFill>
-                  <a:schemeClr val="tx1"/>
-                </a:solidFill>
-              </a:rPr>
-              <a:t>Output 1 :</a:t>
-            </a:r>
-          </a:p>
-          <a:p>
-            <a:pPr algn="ctr"/>
-            <a:r>
-              <a:rPr lang="fr-FR" sz="1600" b="1" dirty="0">
-                <a:solidFill>
-                  <a:schemeClr val="tx1"/>
-                </a:solidFill>
-              </a:rPr>
-              <a:t>Test case</a:t>
-            </a:r>
-          </a:p>
-        </p:txBody>
-      </p:sp>
     </p:spTree>
     <p:extLst>
       <p:ext uri="{BB962C8B-B14F-4D97-AF65-F5344CB8AC3E}">
-        <p14:creationId xmlns:p14="http://schemas.microsoft.com/office/powerpoint/2010/main" val="2431214960"/>
-      </p:ext>
-    </p:extLst>
-  </p:cSld>
-  <p:clrMapOvr>
-    <a:masterClrMapping/>
-  </p:clrMapOvr>
-</p:sld>
-</file>
-
-<file path=ppt/slides/slide5.xml><?xml version="1.0" encoding="utf-8"?>
-<p:sld xmlns:a="http://schemas.openxmlformats.org/drawingml/2006/main" xmlns:r="http://schemas.openxmlformats.org/officeDocument/2006/relationships" xmlns:p="http://schemas.openxmlformats.org/presentationml/2006/main">
-  <p:cSld>
-    <p:spTree>
-      <p:nvGrpSpPr>
-        <p:cNvPr id="1" name=""/>
-        <p:cNvGrpSpPr/>
-        <p:nvPr/>
-      </p:nvGrpSpPr>
-      <p:grpSpPr>
-        <a:xfrm>
-          <a:off x="0" y="0"/>
-          <a:ext cx="0" cy="0"/>
-          <a:chOff x="0" y="0"/>
-          <a:chExt cx="0" cy="0"/>
-        </a:xfrm>
-      </p:grpSpPr>
-      <p:pic>
-        <p:nvPicPr>
-          <p:cNvPr id="4" name="Image 3">
-            <a:extLst>
-              <a:ext uri="{FF2B5EF4-FFF2-40B4-BE49-F238E27FC236}">
-                <a16:creationId xmlns:a16="http://schemas.microsoft.com/office/drawing/2014/main" id="{BA391274-1EAB-47A7-8376-568E3FE7DF35}"/>
-              </a:ext>
-            </a:extLst>
-          </p:cNvPr>
-          <p:cNvPicPr>
-            <a:picLocks noChangeAspect="1"/>
-          </p:cNvPicPr>
-          <p:nvPr/>
-        </p:nvPicPr>
-        <p:blipFill>
-          <a:blip r:embed="rId2"/>
-          <a:stretch>
-            <a:fillRect/>
-          </a:stretch>
-        </p:blipFill>
-        <p:spPr>
-          <a:xfrm>
-            <a:off x="1002350" y="688610"/>
-            <a:ext cx="10187299" cy="5480779"/>
-          </a:xfrm>
-          <a:prstGeom prst="rect">
-            <a:avLst/>
-          </a:prstGeom>
-        </p:spPr>
-      </p:pic>
-    </p:spTree>
-    <p:extLst>
-      <p:ext uri="{BB962C8B-B14F-4D97-AF65-F5344CB8AC3E}">
-        <p14:creationId xmlns:p14="http://schemas.microsoft.com/office/powerpoint/2010/main" val="3421899781"/>
-      </p:ext>
-    </p:extLst>
-  </p:cSld>
-  <p:clrMapOvr>
-    <a:masterClrMapping/>
-  </p:clrMapOvr>
-</p:sld>
-</file>
-
-<file path=ppt/slides/slide6.xml><?xml version="1.0" encoding="utf-8"?>
-<p:sld xmlns:a="http://schemas.openxmlformats.org/drawingml/2006/main" xmlns:r="http://schemas.openxmlformats.org/officeDocument/2006/relationships" xmlns:p="http://schemas.openxmlformats.org/presentationml/2006/main">
-  <p:cSld>
-    <p:spTree>
-      <p:nvGrpSpPr>
-        <p:cNvPr id="1" name=""/>
-        <p:cNvGrpSpPr/>
-        <p:nvPr/>
-      </p:nvGrpSpPr>
-      <p:grpSpPr>
-        <a:xfrm>
-          <a:off x="0" y="0"/>
-          <a:ext cx="0" cy="0"/>
-          <a:chOff x="0" y="0"/>
-          <a:chExt cx="0" cy="0"/>
-        </a:xfrm>
-      </p:grpSpPr>
-      <p:pic>
-        <p:nvPicPr>
-          <p:cNvPr id="50" name="Image 49">
-            <a:extLst>
-              <a:ext uri="{FF2B5EF4-FFF2-40B4-BE49-F238E27FC236}">
-                <a16:creationId xmlns:a16="http://schemas.microsoft.com/office/drawing/2014/main" id="{1A3894A0-D89F-4547-A63F-49313F73074C}"/>
-              </a:ext>
-            </a:extLst>
-          </p:cNvPr>
-          <p:cNvPicPr>
-            <a:picLocks noChangeAspect="1"/>
-          </p:cNvPicPr>
-          <p:nvPr/>
-        </p:nvPicPr>
-        <p:blipFill>
-          <a:blip r:embed="rId2"/>
-          <a:stretch>
-            <a:fillRect/>
-          </a:stretch>
-        </p:blipFill>
-        <p:spPr>
-          <a:xfrm>
-            <a:off x="3940877" y="1315785"/>
-            <a:ext cx="4310246" cy="4072481"/>
-          </a:xfrm>
-          <a:prstGeom prst="rect">
-            <a:avLst/>
-          </a:prstGeom>
-        </p:spPr>
-      </p:pic>
-    </p:spTree>
-    <p:extLst>
-      <p:ext uri="{BB962C8B-B14F-4D97-AF65-F5344CB8AC3E}">
-        <p14:creationId xmlns:p14="http://schemas.microsoft.com/office/powerpoint/2010/main" val="3815171864"/>
+        <p14:creationId xmlns:p14="http://schemas.microsoft.com/office/powerpoint/2010/main" val="4072077103"/>
       </p:ext>
     </p:extLst>
   </p:cSld>

</xml_diff>